<commit_message>
made practice run changes
</commit_message>
<xml_diff>
--- a/CapStonePPT.pptx
+++ b/CapStonePPT.pptx
@@ -5,10 +5,10 @@
     <p:sldMasterId id="2147483769" r:id="rId4"/>
   </p:sldMasterIdLst>
   <p:notesMasterIdLst>
-    <p:notesMasterId r:id="rId20"/>
+    <p:notesMasterId r:id="rId14"/>
   </p:notesMasterIdLst>
   <p:handoutMasterIdLst>
-    <p:handoutMasterId r:id="rId21"/>
+    <p:handoutMasterId r:id="rId15"/>
   </p:handoutMasterIdLst>
   <p:sldIdLst>
     <p:sldId id="330" r:id="rId5"/>
@@ -20,12 +20,6 @@
     <p:sldId id="355" r:id="rId11"/>
     <p:sldId id="334" r:id="rId12"/>
     <p:sldId id="356" r:id="rId13"/>
-    <p:sldId id="353" r:id="rId14"/>
-    <p:sldId id="354" r:id="rId15"/>
-    <p:sldId id="336" r:id="rId16"/>
-    <p:sldId id="331" r:id="rId17"/>
-    <p:sldId id="347" r:id="rId18"/>
-    <p:sldId id="350" r:id="rId19"/>
   </p:sldIdLst>
   <p:sldSz cx="9144000" cy="5143500" type="screen16x9"/>
   <p:notesSz cx="6950075" cy="9236075"/>
@@ -13551,3956 +13545,6 @@
 </p:sld>
 </file>
 
-<file path=ppt/slides/slide10.xml><?xml version="1.0" encoding="utf-8"?>
-<p:sld xmlns:a="http://schemas.openxmlformats.org/drawingml/2006/main" xmlns:r="http://schemas.openxmlformats.org/officeDocument/2006/relationships" xmlns:p="http://schemas.openxmlformats.org/presentationml/2006/main">
-  <p:cSld>
-    <p:spTree>
-      <p:nvGrpSpPr>
-        <p:cNvPr id="1" name=""/>
-        <p:cNvGrpSpPr/>
-        <p:nvPr/>
-      </p:nvGrpSpPr>
-      <p:grpSpPr>
-        <a:xfrm>
-          <a:off x="0" y="0"/>
-          <a:ext cx="0" cy="0"/>
-          <a:chOff x="0" y="0"/>
-          <a:chExt cx="0" cy="0"/>
-        </a:xfrm>
-      </p:grpSpPr>
-    </p:spTree>
-    <p:extLst>
-      <p:ext uri="{BB962C8B-B14F-4D97-AF65-F5344CB8AC3E}">
-        <p14:creationId xmlns:p14="http://schemas.microsoft.com/office/powerpoint/2010/main" val="493387198"/>
-      </p:ext>
-    </p:extLst>
-  </p:cSld>
-  <p:clrMapOvr>
-    <a:masterClrMapping/>
-  </p:clrMapOvr>
-</p:sld>
-</file>
-
-<file path=ppt/slides/slide11.xml><?xml version="1.0" encoding="utf-8"?>
-<p:sld xmlns:a="http://schemas.openxmlformats.org/drawingml/2006/main" xmlns:r="http://schemas.openxmlformats.org/officeDocument/2006/relationships" xmlns:p="http://schemas.openxmlformats.org/presentationml/2006/main">
-  <p:cSld>
-    <p:spTree>
-      <p:nvGrpSpPr>
-        <p:cNvPr id="1" name=""/>
-        <p:cNvGrpSpPr/>
-        <p:nvPr/>
-      </p:nvGrpSpPr>
-      <p:grpSpPr>
-        <a:xfrm>
-          <a:off x="0" y="0"/>
-          <a:ext cx="0" cy="0"/>
-          <a:chOff x="0" y="0"/>
-          <a:chExt cx="0" cy="0"/>
-        </a:xfrm>
-      </p:grpSpPr>
-      <p:sp>
-        <p:nvSpPr>
-          <p:cNvPr id="2" name="Title 1">
-            <a:extLst>
-              <a:ext uri="{FF2B5EF4-FFF2-40B4-BE49-F238E27FC236}">
-                <a16:creationId xmlns:a16="http://schemas.microsoft.com/office/drawing/2014/main" id="{7D9ADCB4-5A60-4B75-90B2-4C01D72EBF9D}"/>
-              </a:ext>
-            </a:extLst>
-          </p:cNvPr>
-          <p:cNvSpPr>
-            <a:spLocks noGrp="1"/>
-          </p:cNvSpPr>
-          <p:nvPr>
-            <p:ph type="title"/>
-          </p:nvPr>
-        </p:nvSpPr>
-        <p:spPr/>
-        <p:txBody>
-          <a:bodyPr/>
-          <a:lstStyle/>
-          <a:p>
-            <a:r>
-              <a:rPr lang="en-US" dirty="0">
-                <a:cs typeface="Arial"/>
-              </a:rPr>
-              <a:t>TEKsystems Slide Templates</a:t>
-            </a:r>
-            <a:endParaRPr lang="en-US" dirty="0"/>
-          </a:p>
-        </p:txBody>
-      </p:sp>
-      <p:sp>
-        <p:nvSpPr>
-          <p:cNvPr id="3" name="Subtitle 2">
-            <a:extLst>
-              <a:ext uri="{FF2B5EF4-FFF2-40B4-BE49-F238E27FC236}">
-                <a16:creationId xmlns:a16="http://schemas.microsoft.com/office/drawing/2014/main" id="{72CBB34D-B5D1-475F-84A2-18ED9A911E07}"/>
-              </a:ext>
-            </a:extLst>
-          </p:cNvPr>
-          <p:cNvSpPr>
-            <a:spLocks noGrp="1"/>
-          </p:cNvSpPr>
-          <p:nvPr>
-            <p:ph type="subTitle" idx="1"/>
-          </p:nvPr>
-        </p:nvSpPr>
-        <p:spPr/>
-        <p:txBody>
-          <a:bodyPr/>
-          <a:lstStyle/>
-          <a:p>
-            <a:endParaRPr lang="en-US"/>
-          </a:p>
-        </p:txBody>
-      </p:sp>
-    </p:spTree>
-    <p:extLst>
-      <p:ext uri="{BB962C8B-B14F-4D97-AF65-F5344CB8AC3E}">
-        <p14:creationId xmlns:p14="http://schemas.microsoft.com/office/powerpoint/2010/main" val="2129983146"/>
-      </p:ext>
-    </p:extLst>
-  </p:cSld>
-  <p:clrMapOvr>
-    <a:masterClrMapping/>
-  </p:clrMapOvr>
-</p:sld>
-</file>
-
-<file path=ppt/slides/slide12.xml><?xml version="1.0" encoding="utf-8"?>
-<p:sld xmlns:a="http://schemas.openxmlformats.org/drawingml/2006/main" xmlns:r="http://schemas.openxmlformats.org/officeDocument/2006/relationships" xmlns:p="http://schemas.openxmlformats.org/presentationml/2006/main">
-  <p:cSld>
-    <p:spTree>
-      <p:nvGrpSpPr>
-        <p:cNvPr id="1" name=""/>
-        <p:cNvGrpSpPr/>
-        <p:nvPr/>
-      </p:nvGrpSpPr>
-      <p:grpSpPr>
-        <a:xfrm>
-          <a:off x="0" y="0"/>
-          <a:ext cx="0" cy="0"/>
-          <a:chOff x="0" y="0"/>
-          <a:chExt cx="0" cy="0"/>
-        </a:xfrm>
-      </p:grpSpPr>
-      <p:sp>
-        <p:nvSpPr>
-          <p:cNvPr id="5" name="Title 4">
-            <a:extLst>
-              <a:ext uri="{FF2B5EF4-FFF2-40B4-BE49-F238E27FC236}">
-                <a16:creationId xmlns:a16="http://schemas.microsoft.com/office/drawing/2014/main" id="{D0905275-2C3F-C740-B4C6-2E4A2060E93A}"/>
-              </a:ext>
-            </a:extLst>
-          </p:cNvPr>
-          <p:cNvSpPr>
-            <a:spLocks noGrp="1"/>
-          </p:cNvSpPr>
-          <p:nvPr>
-            <p:ph type="title"/>
-          </p:nvPr>
-        </p:nvSpPr>
-        <p:spPr/>
-        <p:txBody>
-          <a:bodyPr/>
-          <a:lstStyle/>
-          <a:p>
-            <a:r>
-              <a:rPr lang="en-US" dirty="0"/>
-              <a:t>This Headline is Arial Regular in Dark Blue</a:t>
-            </a:r>
-          </a:p>
-        </p:txBody>
-      </p:sp>
-      <p:sp>
-        <p:nvSpPr>
-          <p:cNvPr id="6" name="Content Placeholder 5">
-            <a:extLst>
-              <a:ext uri="{FF2B5EF4-FFF2-40B4-BE49-F238E27FC236}">
-                <a16:creationId xmlns:a16="http://schemas.microsoft.com/office/drawing/2014/main" id="{B100F3AF-4688-9845-865A-516B841DB928}"/>
-              </a:ext>
-            </a:extLst>
-          </p:cNvPr>
-          <p:cNvSpPr>
-            <a:spLocks noGrp="1"/>
-          </p:cNvSpPr>
-          <p:nvPr>
-            <p:ph idx="1"/>
-          </p:nvPr>
-        </p:nvSpPr>
-        <p:spPr/>
-        <p:txBody>
-          <a:bodyPr>
-            <a:normAutofit/>
-          </a:bodyPr>
-          <a:lstStyle/>
-          <a:p>
-            <a:r>
-              <a:rPr lang="en-US" b="1" dirty="0">
-                <a:solidFill>
-                  <a:srgbClr val="0097D9"/>
-                </a:solidFill>
-              </a:rPr>
-              <a:t>This Bolded portion is Arial in Medium Blue </a:t>
-            </a:r>
-            <a:r>
-              <a:rPr lang="en-US" i="1" dirty="0"/>
-              <a:t>This is a two column content heavy slides. </a:t>
-            </a:r>
-          </a:p>
-          <a:p>
-            <a:r>
-              <a:rPr lang="en-US" b="1" dirty="0">
-                <a:solidFill>
-                  <a:srgbClr val="0097D9"/>
-                </a:solidFill>
-              </a:rPr>
-              <a:t>To </a:t>
-            </a:r>
-            <a:r>
-              <a:rPr lang="en-US" b="1" dirty="0" err="1">
-                <a:solidFill>
-                  <a:srgbClr val="0097D9"/>
-                </a:solidFill>
-              </a:rPr>
-              <a:t>blautemped</a:t>
-            </a:r>
-            <a:r>
-              <a:rPr lang="en-US" b="1" dirty="0">
-                <a:solidFill>
-                  <a:srgbClr val="0097D9"/>
-                </a:solidFill>
-              </a:rPr>
-              <a:t> </a:t>
-            </a:r>
-            <a:r>
-              <a:rPr lang="en-US" b="1" dirty="0" err="1">
-                <a:solidFill>
-                  <a:srgbClr val="0097D9"/>
-                </a:solidFill>
-              </a:rPr>
-              <a:t>est</a:t>
-            </a:r>
-            <a:r>
-              <a:rPr lang="en-US" b="1" dirty="0">
-                <a:solidFill>
-                  <a:srgbClr val="0097D9"/>
-                </a:solidFill>
-              </a:rPr>
-              <a:t> </a:t>
-            </a:r>
-            <a:r>
-              <a:rPr lang="en-US" b="1" dirty="0" err="1">
-                <a:solidFill>
-                  <a:srgbClr val="0097D9"/>
-                </a:solidFill>
-              </a:rPr>
-              <a:t>es</a:t>
-            </a:r>
-            <a:r>
-              <a:rPr lang="en-US" b="1" dirty="0">
-                <a:solidFill>
-                  <a:srgbClr val="0097D9"/>
-                </a:solidFill>
-              </a:rPr>
-              <a:t> </a:t>
-            </a:r>
-            <a:r>
-              <a:rPr lang="en-US" b="1" dirty="0" err="1">
-                <a:solidFill>
-                  <a:srgbClr val="0097D9"/>
-                </a:solidFill>
-              </a:rPr>
-              <a:t>enita</a:t>
-            </a:r>
-            <a:r>
-              <a:rPr lang="en-US" b="1" dirty="0">
-                <a:solidFill>
-                  <a:srgbClr val="0097D9"/>
-                </a:solidFill>
-              </a:rPr>
-              <a:t> </a:t>
-            </a:r>
-            <a:r>
-              <a:rPr lang="en-US" b="1" dirty="0" err="1">
-                <a:solidFill>
-                  <a:srgbClr val="0097D9"/>
-                </a:solidFill>
-              </a:rPr>
-              <a:t>vit</a:t>
-            </a:r>
-            <a:r>
-              <a:rPr lang="en-US" b="1" dirty="0">
-                <a:solidFill>
-                  <a:srgbClr val="0097D9"/>
-                </a:solidFill>
-              </a:rPr>
-              <a:t> </a:t>
-            </a:r>
-            <a:r>
-              <a:rPr lang="en-US" b="1" dirty="0" err="1">
-                <a:solidFill>
-                  <a:srgbClr val="0097D9"/>
-                </a:solidFill>
-              </a:rPr>
-              <a:t>ea</a:t>
-            </a:r>
-            <a:r>
-              <a:rPr lang="en-US" b="1" dirty="0">
-                <a:solidFill>
-                  <a:srgbClr val="0097D9"/>
-                </a:solidFill>
-              </a:rPr>
-              <a:t> </a:t>
-            </a:r>
-            <a:r>
-              <a:rPr lang="en-US" b="1" dirty="0" err="1">
-                <a:solidFill>
-                  <a:srgbClr val="0097D9"/>
-                </a:solidFill>
-              </a:rPr>
-              <a:t>sunt</a:t>
-            </a:r>
-            <a:r>
-              <a:rPr lang="en-US" b="1" dirty="0">
-                <a:solidFill>
-                  <a:srgbClr val="0097D9"/>
-                </a:solidFill>
-              </a:rPr>
-              <a:t> </a:t>
-            </a:r>
-            <a:r>
-              <a:rPr lang="en-US" dirty="0" err="1"/>
-              <a:t>pliquidem</a:t>
-            </a:r>
-            <a:r>
-              <a:rPr lang="en-US" dirty="0"/>
-              <a:t> </a:t>
-            </a:r>
-            <a:r>
-              <a:rPr lang="en-US" dirty="0" err="1"/>
-              <a:t>velitat</a:t>
-            </a:r>
-            <a:r>
-              <a:rPr lang="en-US" dirty="0"/>
-              <a:t> </a:t>
-            </a:r>
-            <a:r>
-              <a:rPr lang="en-US" dirty="0" err="1"/>
-              <a:t>emporum</a:t>
-            </a:r>
-            <a:r>
-              <a:rPr lang="en-US" dirty="0"/>
-              <a:t> des </a:t>
-            </a:r>
-            <a:r>
-              <a:rPr lang="en-US" dirty="0" err="1"/>
-              <a:t>apedi</a:t>
-            </a:r>
-            <a:r>
-              <a:rPr lang="en-US" dirty="0"/>
-              <a:t> </a:t>
-            </a:r>
-            <a:r>
-              <a:rPr lang="en-US" dirty="0" err="1"/>
-              <a:t>dolorrovidus</a:t>
-            </a:r>
-            <a:r>
-              <a:rPr lang="en-US" dirty="0"/>
-              <a:t> </a:t>
-            </a:r>
-            <a:r>
-              <a:rPr lang="en-US" dirty="0" err="1"/>
-              <a:t>quat</a:t>
-            </a:r>
-            <a:r>
-              <a:rPr lang="en-US" dirty="0"/>
-              <a:t> </a:t>
-            </a:r>
-            <a:r>
-              <a:rPr lang="en-US" dirty="0" err="1"/>
-              <a:t>accus</a:t>
-            </a:r>
-            <a:r>
-              <a:rPr lang="en-US" dirty="0"/>
-              <a:t> </a:t>
-            </a:r>
-            <a:r>
-              <a:rPr lang="en-US" dirty="0" err="1"/>
-              <a:t>voluptae</a:t>
-            </a:r>
-            <a:r>
-              <a:rPr lang="en-US" dirty="0"/>
-              <a:t> </a:t>
-            </a:r>
-            <a:r>
-              <a:rPr lang="en-US" dirty="0" err="1"/>
-              <a:t>eiciam</a:t>
-            </a:r>
-            <a:r>
-              <a:rPr lang="en-US" dirty="0"/>
-              <a:t> </a:t>
-            </a:r>
-            <a:r>
-              <a:rPr lang="en-US" dirty="0" err="1"/>
-              <a:t>reri</a:t>
-            </a:r>
-            <a:r>
-              <a:rPr lang="en-US" dirty="0"/>
-              <a:t> </a:t>
-            </a:r>
-            <a:r>
-              <a:rPr lang="en-US" dirty="0" err="1"/>
-              <a:t>doluptaest</a:t>
-            </a:r>
-            <a:r>
-              <a:rPr lang="en-US" dirty="0"/>
-              <a:t> </a:t>
-            </a:r>
-            <a:r>
-              <a:rPr lang="en-US" dirty="0" err="1"/>
-              <a:t>odis</a:t>
-            </a:r>
-            <a:r>
-              <a:rPr lang="en-US" dirty="0"/>
-              <a:t> </a:t>
-            </a:r>
-            <a:r>
-              <a:rPr lang="en-US" dirty="0" err="1"/>
-              <a:t>assi</a:t>
-            </a:r>
-            <a:r>
-              <a:rPr lang="en-US" dirty="0"/>
-              <a:t> </a:t>
-            </a:r>
-            <a:r>
-              <a:rPr lang="en-US" dirty="0" err="1"/>
-              <a:t>dolesse</a:t>
-            </a:r>
-            <a:r>
-              <a:rPr lang="en-US" dirty="0"/>
-              <a:t> </a:t>
-            </a:r>
-            <a:r>
-              <a:rPr lang="en-US" dirty="0" err="1"/>
-              <a:t>rciminctas</a:t>
-            </a:r>
-            <a:r>
-              <a:rPr lang="en-US" dirty="0"/>
-              <a:t> </a:t>
-            </a:r>
-            <a:r>
-              <a:rPr lang="en-US" dirty="0" err="1"/>
-              <a:t>dolesec</a:t>
-            </a:r>
-            <a:r>
-              <a:rPr lang="en-US" dirty="0"/>
-              <a:t> </a:t>
-            </a:r>
-            <a:r>
-              <a:rPr lang="en-US" dirty="0" err="1"/>
-              <a:t>eperumq</a:t>
-            </a:r>
-            <a:r>
-              <a:rPr lang="en-US" dirty="0"/>
-              <a:t> </a:t>
-            </a:r>
-            <a:r>
-              <a:rPr lang="en-US" dirty="0" err="1"/>
-              <a:t>uuntio</a:t>
-            </a:r>
-            <a:r>
-              <a:rPr lang="en-US" dirty="0"/>
-              <a:t> que </a:t>
-            </a:r>
-            <a:r>
-              <a:rPr lang="en-US" dirty="0" err="1"/>
-              <a:t>vitaquia</a:t>
-            </a:r>
-            <a:r>
-              <a:rPr lang="en-US" dirty="0"/>
-              <a:t> </a:t>
-            </a:r>
-            <a:r>
-              <a:rPr lang="en-US" dirty="0" err="1"/>
-              <a:t>sam</a:t>
-            </a:r>
-            <a:r>
-              <a:rPr lang="en-US" dirty="0"/>
-              <a:t>, </a:t>
-            </a:r>
-            <a:r>
-              <a:rPr lang="en-US" dirty="0" err="1"/>
-              <a:t>nonseque</a:t>
-            </a:r>
-            <a:r>
-              <a:rPr lang="en-US" dirty="0"/>
-              <a:t> pro qui </a:t>
-            </a:r>
-            <a:r>
-              <a:rPr lang="en-US" dirty="0" err="1"/>
-              <a:t>offictibus</a:t>
-            </a:r>
-            <a:r>
-              <a:rPr lang="en-US" dirty="0"/>
-              <a:t> </a:t>
-            </a:r>
-            <a:r>
-              <a:rPr lang="en-US" dirty="0" err="1"/>
-              <a:t>aperestrum</a:t>
-            </a:r>
-            <a:r>
-              <a:rPr lang="en-US" dirty="0"/>
-              <a:t> quos et </a:t>
-            </a:r>
-            <a:r>
-              <a:rPr lang="en-US" dirty="0" err="1"/>
-              <a:t>harcimilia</a:t>
-            </a:r>
-            <a:r>
-              <a:rPr lang="en-US" dirty="0"/>
-              <a:t> </a:t>
-            </a:r>
-            <a:r>
-              <a:rPr lang="en-US" dirty="0" err="1"/>
-              <a:t>nonsequaero</a:t>
-            </a:r>
-            <a:r>
-              <a:rPr lang="en-US" dirty="0"/>
-              <a:t> </a:t>
-            </a:r>
-            <a:r>
-              <a:rPr lang="en-US" dirty="0" err="1"/>
-              <a:t>eaquas</a:t>
-            </a:r>
-            <a:r>
-              <a:rPr lang="en-US" dirty="0"/>
-              <a:t> </a:t>
-            </a:r>
-            <a:r>
-              <a:rPr lang="en-US" dirty="0" err="1"/>
-              <a:t>assiminverum</a:t>
-            </a:r>
-            <a:r>
-              <a:rPr lang="en-US" dirty="0"/>
-              <a:t>? </a:t>
-            </a:r>
-            <a:r>
-              <a:rPr lang="en-US" dirty="0" err="1"/>
-              <a:t>Optae</a:t>
-            </a:r>
-            <a:r>
-              <a:rPr lang="en-US" dirty="0"/>
-              <a:t> </a:t>
-            </a:r>
-            <a:r>
-              <a:rPr lang="en-US" dirty="0" err="1"/>
-              <a:t>peribus</a:t>
-            </a:r>
-            <a:r>
-              <a:rPr lang="en-US" dirty="0"/>
-              <a:t> re, </a:t>
-            </a:r>
-            <a:r>
-              <a:rPr lang="en-US" dirty="0" err="1"/>
-              <a:t>aspici</a:t>
-            </a:r>
-            <a:r>
-              <a:rPr lang="en-US" dirty="0"/>
-              <a:t> </a:t>
-            </a:r>
-            <a:r>
-              <a:rPr lang="en-US" dirty="0" err="1"/>
-              <a:t>tem</a:t>
-            </a:r>
-            <a:r>
-              <a:rPr lang="en-US" dirty="0"/>
-              <a:t> </a:t>
-            </a:r>
-            <a:r>
-              <a:rPr lang="en-US" dirty="0" err="1"/>
-              <a:t>velestis</a:t>
-            </a:r>
-            <a:r>
-              <a:rPr lang="en-US" dirty="0"/>
-              <a:t> </a:t>
-            </a:r>
-            <a:r>
-              <a:rPr lang="en-US" dirty="0" err="1"/>
-              <a:t>velitas</a:t>
-            </a:r>
-            <a:r>
-              <a:rPr lang="en-US" dirty="0"/>
-              <a:t> </a:t>
-            </a:r>
-            <a:r>
-              <a:rPr lang="en-US" dirty="0" err="1"/>
-              <a:t>ditem</a:t>
-            </a:r>
-            <a:r>
-              <a:rPr lang="en-US" dirty="0"/>
-              <a:t> rem </a:t>
-            </a:r>
-            <a:r>
-              <a:rPr lang="en-US" dirty="0" err="1"/>
-              <a:t>nonseque</a:t>
-            </a:r>
-            <a:r>
-              <a:rPr lang="en-US" dirty="0"/>
-              <a:t> pro qui </a:t>
-            </a:r>
-          </a:p>
-          <a:p>
-            <a:r>
-              <a:rPr lang="en-US" b="1" dirty="0" err="1">
-                <a:solidFill>
-                  <a:srgbClr val="0097D9"/>
-                </a:solidFill>
-              </a:rPr>
-              <a:t>Tem</a:t>
-            </a:r>
-            <a:r>
-              <a:rPr lang="en-US" b="1" dirty="0">
-                <a:solidFill>
-                  <a:srgbClr val="0097D9"/>
-                </a:solidFill>
-              </a:rPr>
-              <a:t> </a:t>
-            </a:r>
-            <a:r>
-              <a:rPr lang="en-US" b="1" dirty="0" err="1">
-                <a:solidFill>
-                  <a:srgbClr val="0097D9"/>
-                </a:solidFill>
-              </a:rPr>
-              <a:t>quiae</a:t>
-            </a:r>
-            <a:r>
-              <a:rPr lang="en-US" b="1" dirty="0">
-                <a:solidFill>
-                  <a:srgbClr val="0097D9"/>
-                </a:solidFill>
-              </a:rPr>
-              <a:t> </a:t>
-            </a:r>
-            <a:r>
-              <a:rPr lang="en-US" b="1" dirty="0" err="1">
-                <a:solidFill>
-                  <a:srgbClr val="0097D9"/>
-                </a:solidFill>
-              </a:rPr>
-              <a:t>ni</a:t>
-            </a:r>
-            <a:r>
-              <a:rPr lang="en-US" b="1" dirty="0">
-                <a:solidFill>
-                  <a:srgbClr val="0097D9"/>
-                </a:solidFill>
-              </a:rPr>
-              <a:t> </a:t>
-            </a:r>
-            <a:r>
-              <a:rPr lang="en-US" b="1" dirty="0" err="1">
-                <a:solidFill>
-                  <a:srgbClr val="0097D9"/>
-                </a:solidFill>
-              </a:rPr>
-              <a:t>descimus</a:t>
-            </a:r>
-            <a:r>
-              <a:rPr lang="en-US" b="1" dirty="0">
-                <a:solidFill>
-                  <a:srgbClr val="0097D9"/>
-                </a:solidFill>
-              </a:rPr>
-              <a:t>, </a:t>
-            </a:r>
-            <a:r>
-              <a:rPr lang="en-US" b="1" dirty="0" err="1">
-                <a:solidFill>
-                  <a:srgbClr val="0097D9"/>
-                </a:solidFill>
-              </a:rPr>
-              <a:t>necte</a:t>
-            </a:r>
-            <a:r>
-              <a:rPr lang="en-US" b="1" dirty="0">
-                <a:solidFill>
-                  <a:srgbClr val="0097D9"/>
-                </a:solidFill>
-              </a:rPr>
-              <a:t> </a:t>
-            </a:r>
-            <a:r>
-              <a:rPr lang="en-US" b="1" dirty="0" err="1">
-                <a:solidFill>
-                  <a:srgbClr val="0097D9"/>
-                </a:solidFill>
-              </a:rPr>
-              <a:t>reptiunt</a:t>
-            </a:r>
-            <a:r>
-              <a:rPr lang="en-US" b="1" dirty="0">
-                <a:solidFill>
-                  <a:srgbClr val="0097D9"/>
-                </a:solidFill>
-              </a:rPr>
-              <a:t> </a:t>
-            </a:r>
-            <a:r>
-              <a:rPr lang="en-US" dirty="0"/>
-              <a:t>at </a:t>
-            </a:r>
-            <a:r>
-              <a:rPr lang="en-US" dirty="0" err="1"/>
-              <a:t>quiam</a:t>
-            </a:r>
-            <a:r>
-              <a:rPr lang="en-US" dirty="0"/>
-              <a:t> </a:t>
-            </a:r>
-            <a:r>
-              <a:rPr lang="en-US" dirty="0" err="1"/>
-              <a:t>repratur</a:t>
-            </a:r>
-            <a:r>
-              <a:rPr lang="en-US" dirty="0"/>
-              <a:t> </a:t>
-            </a:r>
-            <a:r>
-              <a:rPr lang="en-US" dirty="0" err="1"/>
-              <a:t>modissimet</a:t>
-            </a:r>
-            <a:r>
-              <a:rPr lang="en-US" dirty="0"/>
-              <a:t> mil </a:t>
-            </a:r>
-            <a:r>
-              <a:rPr lang="en-US" dirty="0" err="1"/>
-              <a:t>moluptam</a:t>
-            </a:r>
-            <a:r>
-              <a:rPr lang="en-US" dirty="0"/>
-              <a:t> quos </a:t>
-            </a:r>
-            <a:r>
-              <a:rPr lang="en-US" dirty="0" err="1"/>
-              <a:t>nos</a:t>
-            </a:r>
-            <a:r>
-              <a:rPr lang="en-US" dirty="0"/>
-              <a:t> </a:t>
-            </a:r>
-            <a:r>
-              <a:rPr lang="en-US" dirty="0" err="1"/>
-              <a:t>magnis</a:t>
-            </a:r>
-            <a:r>
-              <a:rPr lang="en-US" dirty="0"/>
-              <a:t> </a:t>
-            </a:r>
-            <a:r>
-              <a:rPr lang="en-US" dirty="0" err="1"/>
-              <a:t>sitat</a:t>
-            </a:r>
-            <a:r>
-              <a:rPr lang="en-US" dirty="0"/>
-              <a:t>.</a:t>
-            </a:r>
-          </a:p>
-          <a:p>
-            <a:r>
-              <a:rPr lang="en-US" b="1" dirty="0">
-                <a:solidFill>
-                  <a:srgbClr val="0097D9"/>
-                </a:solidFill>
-              </a:rPr>
-              <a:t>Ro </a:t>
-            </a:r>
-            <a:r>
-              <a:rPr lang="en-US" b="1" dirty="0" err="1">
-                <a:solidFill>
-                  <a:srgbClr val="0097D9"/>
-                </a:solidFill>
-              </a:rPr>
-              <a:t>moluptaqui</a:t>
-            </a:r>
-            <a:r>
-              <a:rPr lang="en-US" b="1" dirty="0">
-                <a:solidFill>
-                  <a:srgbClr val="0097D9"/>
-                </a:solidFill>
-              </a:rPr>
-              <a:t> </a:t>
-            </a:r>
-            <a:r>
-              <a:rPr lang="en-US" b="1" dirty="0" err="1">
-                <a:solidFill>
-                  <a:srgbClr val="0097D9"/>
-                </a:solidFill>
-              </a:rPr>
-              <a:t>dolupturio</a:t>
-            </a:r>
-            <a:r>
-              <a:rPr lang="en-US" b="1" dirty="0">
-                <a:solidFill>
-                  <a:srgbClr val="0097D9"/>
-                </a:solidFill>
-              </a:rPr>
-              <a:t> </a:t>
-            </a:r>
-            <a:r>
-              <a:rPr lang="en-US" b="1" dirty="0" err="1">
-                <a:solidFill>
-                  <a:srgbClr val="0097D9"/>
-                </a:solidFill>
-              </a:rPr>
-              <a:t>te</a:t>
-            </a:r>
-            <a:r>
-              <a:rPr lang="en-US" b="1" dirty="0">
-                <a:solidFill>
-                  <a:srgbClr val="0097D9"/>
-                </a:solidFill>
-              </a:rPr>
-              <a:t> </a:t>
-            </a:r>
-            <a:r>
-              <a:rPr lang="en-US" b="1" dirty="0" err="1">
-                <a:solidFill>
-                  <a:srgbClr val="0097D9"/>
-                </a:solidFill>
-              </a:rPr>
-              <a:t>prae</a:t>
-            </a:r>
-            <a:r>
-              <a:rPr lang="en-US" b="1" dirty="0">
-                <a:solidFill>
-                  <a:srgbClr val="0097D9"/>
-                </a:solidFill>
-              </a:rPr>
-              <a:t> </a:t>
-            </a:r>
-            <a:r>
-              <a:rPr lang="en-US" dirty="0" err="1"/>
-              <a:t>dolorem</a:t>
-            </a:r>
-            <a:r>
-              <a:rPr lang="en-US" dirty="0"/>
-              <a:t> </a:t>
-            </a:r>
-            <a:r>
-              <a:rPr lang="en-US" dirty="0" err="1"/>
-              <a:t>dolorehenis</a:t>
-            </a:r>
-            <a:r>
-              <a:rPr lang="en-US" dirty="0"/>
-              <a:t> ab </a:t>
-            </a:r>
-            <a:r>
-              <a:rPr lang="en-US" dirty="0" err="1"/>
-              <a:t>invelli</a:t>
-            </a:r>
-            <a:r>
-              <a:rPr lang="en-US" dirty="0"/>
-              <a:t> </a:t>
-            </a:r>
-            <a:r>
-              <a:rPr lang="en-US" dirty="0" err="1"/>
-              <a:t>ciisimu</a:t>
-            </a:r>
-            <a:r>
-              <a:rPr lang="en-US" dirty="0"/>
-              <a:t> </a:t>
-            </a:r>
-            <a:r>
-              <a:rPr lang="en-US" dirty="0" err="1"/>
-              <a:t>sanitia</a:t>
-            </a:r>
-            <a:r>
-              <a:rPr lang="en-US" dirty="0"/>
-              <a:t> </a:t>
-            </a:r>
-            <a:r>
-              <a:rPr lang="en-US" dirty="0" err="1"/>
-              <a:t>quatiisi</a:t>
-            </a:r>
-            <a:r>
-              <a:rPr lang="en-US" dirty="0"/>
-              <a:t> </a:t>
-            </a:r>
-            <a:r>
-              <a:rPr lang="en-US" dirty="0" err="1"/>
-              <a:t>siti</a:t>
-            </a:r>
-            <a:r>
-              <a:rPr lang="en-US" dirty="0"/>
-              <a:t> con </a:t>
-            </a:r>
-            <a:r>
-              <a:rPr lang="en-US" dirty="0" err="1"/>
-              <a:t>consequi</a:t>
-            </a:r>
-            <a:r>
-              <a:rPr lang="en-US" dirty="0"/>
-              <a:t> </a:t>
-            </a:r>
-            <a:r>
-              <a:rPr lang="en-US" dirty="0" err="1"/>
-              <a:t>tem</a:t>
-            </a:r>
-            <a:r>
-              <a:rPr lang="en-US" dirty="0"/>
-              <a:t>. </a:t>
-            </a:r>
-            <a:r>
-              <a:rPr lang="en-US" dirty="0" err="1"/>
-              <a:t>Optae</a:t>
-            </a:r>
-            <a:r>
-              <a:rPr lang="en-US" dirty="0"/>
-              <a:t> </a:t>
-            </a:r>
-            <a:r>
-              <a:rPr lang="en-US" dirty="0" err="1"/>
-              <a:t>peribus</a:t>
-            </a:r>
-            <a:r>
-              <a:rPr lang="en-US" dirty="0"/>
-              <a:t> re, </a:t>
-            </a:r>
-            <a:r>
-              <a:rPr lang="en-US" dirty="0" err="1"/>
-              <a:t>aspici</a:t>
-            </a:r>
-            <a:r>
-              <a:rPr lang="en-US" dirty="0"/>
-              <a:t> </a:t>
-            </a:r>
-            <a:r>
-              <a:rPr lang="en-US" dirty="0" err="1"/>
-              <a:t>tem</a:t>
-            </a:r>
-            <a:r>
-              <a:rPr lang="en-US" dirty="0"/>
-              <a:t> </a:t>
-            </a:r>
-            <a:r>
-              <a:rPr lang="en-US" dirty="0" err="1"/>
-              <a:t>velestis</a:t>
-            </a:r>
-            <a:r>
-              <a:rPr lang="en-US" dirty="0"/>
-              <a:t> </a:t>
-            </a:r>
-            <a:r>
-              <a:rPr lang="en-US" dirty="0" err="1"/>
-              <a:t>velitas</a:t>
-            </a:r>
-            <a:r>
-              <a:rPr lang="en-US" dirty="0"/>
-              <a:t> </a:t>
-            </a:r>
-            <a:r>
-              <a:rPr lang="en-US" dirty="0" err="1"/>
-              <a:t>ditem</a:t>
-            </a:r>
-            <a:r>
-              <a:rPr lang="en-US" dirty="0"/>
-              <a:t> rem</a:t>
-            </a:r>
-          </a:p>
-          <a:p>
-            <a:endParaRPr lang="en-US" dirty="0"/>
-          </a:p>
-        </p:txBody>
-      </p:sp>
-      <p:sp>
-        <p:nvSpPr>
-          <p:cNvPr id="8" name="Slide Number Placeholder 5">
-            <a:extLst>
-              <a:ext uri="{FF2B5EF4-FFF2-40B4-BE49-F238E27FC236}">
-                <a16:creationId xmlns:a16="http://schemas.microsoft.com/office/drawing/2014/main" id="{25D23053-7992-9F47-90F7-4D13C92AEF9A}"/>
-              </a:ext>
-            </a:extLst>
-          </p:cNvPr>
-          <p:cNvSpPr>
-            <a:spLocks noGrp="1"/>
-          </p:cNvSpPr>
-          <p:nvPr>
-            <p:ph type="sldNum" sz="quarter" idx="12"/>
-          </p:nvPr>
-        </p:nvSpPr>
-        <p:spPr/>
-        <p:txBody>
-          <a:bodyPr/>
-          <a:lstStyle/>
-          <a:p>
-            <a:fld id="{535EF33A-04D8-4107-96E5-33B70AE88DFF}" type="slidenum">
-              <a:rPr lang="en-US" smtClean="0"/>
-              <a:pPr/>
-              <a:t>12</a:t>
-            </a:fld>
-            <a:endParaRPr lang="en-US" dirty="0"/>
-          </a:p>
-        </p:txBody>
-      </p:sp>
-      <p:sp>
-        <p:nvSpPr>
-          <p:cNvPr id="7" name="Text Placeholder 6">
-            <a:extLst>
-              <a:ext uri="{FF2B5EF4-FFF2-40B4-BE49-F238E27FC236}">
-                <a16:creationId xmlns:a16="http://schemas.microsoft.com/office/drawing/2014/main" id="{7B801328-E601-F348-9B04-F0CA079C1461}"/>
-              </a:ext>
-            </a:extLst>
-          </p:cNvPr>
-          <p:cNvSpPr>
-            <a:spLocks noGrp="1"/>
-          </p:cNvSpPr>
-          <p:nvPr>
-            <p:ph type="body" sz="quarter" idx="13"/>
-          </p:nvPr>
-        </p:nvSpPr>
-        <p:spPr/>
-        <p:txBody>
-          <a:bodyPr/>
-          <a:lstStyle/>
-          <a:p>
-            <a:r>
-              <a:rPr lang="en-US" dirty="0"/>
-              <a:t>This Subtitle is Arial in Light Orange</a:t>
-            </a:r>
-          </a:p>
-        </p:txBody>
-      </p:sp>
-    </p:spTree>
-    <p:extLst>
-      <p:ext uri="{BB962C8B-B14F-4D97-AF65-F5344CB8AC3E}">
-        <p14:creationId xmlns:p14="http://schemas.microsoft.com/office/powerpoint/2010/main" val="3918084645"/>
-      </p:ext>
-    </p:extLst>
-  </p:cSld>
-  <p:clrMapOvr>
-    <a:masterClrMapping/>
-  </p:clrMapOvr>
-  <mc:AlternateContent xmlns:mc="http://schemas.openxmlformats.org/markup-compatibility/2006" xmlns:p14="http://schemas.microsoft.com/office/powerpoint/2010/main">
-    <mc:Choice Requires="p14">
-      <p:transition spd="med" p14:dur="700">
-        <p:fade/>
-      </p:transition>
-    </mc:Choice>
-    <mc:Fallback xmlns="">
-      <p:transition spd="med">
-        <p:fade/>
-      </p:transition>
-    </mc:Fallback>
-  </mc:AlternateContent>
-</p:sld>
-</file>
-
-<file path=ppt/slides/slide13.xml><?xml version="1.0" encoding="utf-8"?>
-<p:sld xmlns:a="http://schemas.openxmlformats.org/drawingml/2006/main" xmlns:r="http://schemas.openxmlformats.org/officeDocument/2006/relationships" xmlns:p="http://schemas.openxmlformats.org/presentationml/2006/main">
-  <p:cSld>
-    <p:spTree>
-      <p:nvGrpSpPr>
-        <p:cNvPr id="1" name=""/>
-        <p:cNvGrpSpPr/>
-        <p:nvPr/>
-      </p:nvGrpSpPr>
-      <p:grpSpPr>
-        <a:xfrm>
-          <a:off x="0" y="0"/>
-          <a:ext cx="0" cy="0"/>
-          <a:chOff x="0" y="0"/>
-          <a:chExt cx="0" cy="0"/>
-        </a:xfrm>
-      </p:grpSpPr>
-      <p:sp>
-        <p:nvSpPr>
-          <p:cNvPr id="8" name="Content Placeholder 7">
-            <a:extLst>
-              <a:ext uri="{FF2B5EF4-FFF2-40B4-BE49-F238E27FC236}">
-                <a16:creationId xmlns:a16="http://schemas.microsoft.com/office/drawing/2014/main" id="{07633A60-68FA-EB48-851F-185DFAC1C529}"/>
-              </a:ext>
-            </a:extLst>
-          </p:cNvPr>
-          <p:cNvSpPr>
-            <a:spLocks noGrp="1"/>
-          </p:cNvSpPr>
-          <p:nvPr>
-            <p:ph sz="half" idx="1"/>
-          </p:nvPr>
-        </p:nvSpPr>
-        <p:spPr/>
-        <p:txBody>
-          <a:bodyPr/>
-          <a:lstStyle/>
-          <a:p>
-            <a:r>
-              <a:rPr lang="en-US" dirty="0"/>
-              <a:t>This slide is a two content option with imagery. To </a:t>
-            </a:r>
-            <a:br>
-              <a:rPr lang="en-US" dirty="0"/>
-            </a:br>
-            <a:r>
-              <a:rPr lang="en-US" dirty="0"/>
-              <a:t>create the blue effect, click on the image, select the </a:t>
-            </a:r>
-            <a:br>
-              <a:rPr lang="en-US" dirty="0"/>
-            </a:br>
-            <a:r>
-              <a:rPr lang="en-US" dirty="0"/>
-              <a:t>picture properties and drop the transparency to the </a:t>
-            </a:r>
-            <a:br>
-              <a:rPr lang="en-US" dirty="0"/>
-            </a:br>
-            <a:r>
-              <a:rPr lang="en-US" dirty="0"/>
-              <a:t>desired opacity.</a:t>
-            </a:r>
-          </a:p>
-        </p:txBody>
-      </p:sp>
-      <p:pic>
-        <p:nvPicPr>
-          <p:cNvPr id="14" name="Picture Placeholder 13">
-            <a:extLst>
-              <a:ext uri="{FF2B5EF4-FFF2-40B4-BE49-F238E27FC236}">
-                <a16:creationId xmlns:a16="http://schemas.microsoft.com/office/drawing/2014/main" id="{E7CF66E4-961A-5B4D-BBD5-6D6F61CF07DB}"/>
-              </a:ext>
-            </a:extLst>
-          </p:cNvPr>
-          <p:cNvPicPr>
-            <a:picLocks noGrp="1" noChangeAspect="1"/>
-          </p:cNvPicPr>
-          <p:nvPr>
-            <p:ph type="pic" sz="quarter" idx="13"/>
-          </p:nvPr>
-        </p:nvPicPr>
-        <p:blipFill rotWithShape="1">
-          <a:blip r:embed="rId2" cstate="screen">
-            <a:alphaModFix amt="69000"/>
-            <a:extLst>
-              <a:ext uri="{28A0092B-C50C-407E-A947-70E740481C1C}">
-                <a14:useLocalDpi xmlns:a14="http://schemas.microsoft.com/office/drawing/2010/main"/>
-              </a:ext>
-            </a:extLst>
-          </a:blip>
-          <a:srcRect/>
-          <a:stretch/>
-        </p:blipFill>
-        <p:spPr>
-          <a:xfrm>
-            <a:off x="504825" y="1655180"/>
-            <a:ext cx="3997701" cy="1296364"/>
-          </a:xfrm>
-        </p:spPr>
-      </p:pic>
-      <p:sp>
-        <p:nvSpPr>
-          <p:cNvPr id="7" name="Title 6">
-            <a:extLst>
-              <a:ext uri="{FF2B5EF4-FFF2-40B4-BE49-F238E27FC236}">
-                <a16:creationId xmlns:a16="http://schemas.microsoft.com/office/drawing/2014/main" id="{BA589A53-2DD7-164C-B603-261A24E6203A}"/>
-              </a:ext>
-            </a:extLst>
-          </p:cNvPr>
-          <p:cNvSpPr>
-            <a:spLocks noGrp="1"/>
-          </p:cNvSpPr>
-          <p:nvPr>
-            <p:ph type="title"/>
-          </p:nvPr>
-        </p:nvSpPr>
-        <p:spPr/>
-        <p:txBody>
-          <a:bodyPr/>
-          <a:lstStyle/>
-          <a:p>
-            <a:r>
-              <a:rPr lang="en-US" dirty="0"/>
-              <a:t>This Headline is Arial Regular in Dark Blue</a:t>
-            </a:r>
-          </a:p>
-        </p:txBody>
-      </p:sp>
-      <p:sp>
-        <p:nvSpPr>
-          <p:cNvPr id="10" name="Content Placeholder 9">
-            <a:extLst>
-              <a:ext uri="{FF2B5EF4-FFF2-40B4-BE49-F238E27FC236}">
-                <a16:creationId xmlns:a16="http://schemas.microsoft.com/office/drawing/2014/main" id="{A7F5E52A-3874-BD41-ADC1-993E24BBB1A4}"/>
-              </a:ext>
-            </a:extLst>
-          </p:cNvPr>
-          <p:cNvSpPr>
-            <a:spLocks noGrp="1"/>
-          </p:cNvSpPr>
-          <p:nvPr>
-            <p:ph sz="half" idx="14"/>
-          </p:nvPr>
-        </p:nvSpPr>
-        <p:spPr/>
-        <p:txBody>
-          <a:bodyPr/>
-          <a:lstStyle/>
-          <a:p>
-            <a:r>
-              <a:rPr lang="en-US"/>
-              <a:t>Et alique prorenim ipsa sum etur? Qui consed most aut quia is voloria voluptatio beror sam, sites vollant, teceaque volorep erchil maximolupta sit, quo tem quunt rem quaeres ciiscia tenimo mo verecus, quis ut aliaess</a:t>
-            </a:r>
-            <a:endParaRPr lang="en-US" dirty="0"/>
-          </a:p>
-        </p:txBody>
-      </p:sp>
-      <p:pic>
-        <p:nvPicPr>
-          <p:cNvPr id="16" name="Picture Placeholder 15">
-            <a:extLst>
-              <a:ext uri="{FF2B5EF4-FFF2-40B4-BE49-F238E27FC236}">
-                <a16:creationId xmlns:a16="http://schemas.microsoft.com/office/drawing/2014/main" id="{58B0F8A2-7739-C346-8D02-11BE3B0C9BFE}"/>
-              </a:ext>
-            </a:extLst>
-          </p:cNvPr>
-          <p:cNvPicPr>
-            <a:picLocks noGrp="1" noChangeAspect="1"/>
-          </p:cNvPicPr>
-          <p:nvPr>
-            <p:ph type="pic" sz="quarter" idx="15"/>
-          </p:nvPr>
-        </p:nvPicPr>
-        <p:blipFill>
-          <a:blip r:embed="rId3" cstate="screen">
-            <a:alphaModFix amt="65000"/>
-            <a:extLst>
-              <a:ext uri="{28A0092B-C50C-407E-A947-70E740481C1C}">
-                <a14:useLocalDpi xmlns:a14="http://schemas.microsoft.com/office/drawing/2010/main"/>
-              </a:ext>
-            </a:extLst>
-          </a:blip>
-          <a:srcRect/>
-          <a:stretch>
-            <a:fillRect/>
-          </a:stretch>
-        </p:blipFill>
-        <p:spPr/>
-      </p:pic>
-      <p:sp>
-        <p:nvSpPr>
-          <p:cNvPr id="17" name="Slide Number Placeholder 5">
-            <a:extLst>
-              <a:ext uri="{FF2B5EF4-FFF2-40B4-BE49-F238E27FC236}">
-                <a16:creationId xmlns:a16="http://schemas.microsoft.com/office/drawing/2014/main" id="{A4A90959-A04F-464A-8A3B-FE3ACB882A44}"/>
-              </a:ext>
-            </a:extLst>
-          </p:cNvPr>
-          <p:cNvSpPr>
-            <a:spLocks noGrp="1"/>
-          </p:cNvSpPr>
-          <p:nvPr>
-            <p:ph type="sldNum" sz="quarter" idx="12"/>
-          </p:nvPr>
-        </p:nvSpPr>
-        <p:spPr/>
-        <p:txBody>
-          <a:bodyPr/>
-          <a:lstStyle/>
-          <a:p>
-            <a:fld id="{535EF33A-04D8-4107-96E5-33B70AE88DFF}" type="slidenum">
-              <a:rPr lang="en-US" smtClean="0"/>
-              <a:pPr/>
-              <a:t>13</a:t>
-            </a:fld>
-            <a:endParaRPr lang="en-US" dirty="0"/>
-          </a:p>
-        </p:txBody>
-      </p:sp>
-      <p:sp>
-        <p:nvSpPr>
-          <p:cNvPr id="12" name="Text Placeholder 11">
-            <a:extLst>
-              <a:ext uri="{FF2B5EF4-FFF2-40B4-BE49-F238E27FC236}">
-                <a16:creationId xmlns:a16="http://schemas.microsoft.com/office/drawing/2014/main" id="{32F0EFD3-FAD0-B04F-AFFE-BE3E7BB589D5}"/>
-              </a:ext>
-            </a:extLst>
-          </p:cNvPr>
-          <p:cNvSpPr>
-            <a:spLocks noGrp="1"/>
-          </p:cNvSpPr>
-          <p:nvPr>
-            <p:ph type="body" sz="quarter" idx="16"/>
-          </p:nvPr>
-        </p:nvSpPr>
-        <p:spPr/>
-        <p:txBody>
-          <a:bodyPr/>
-          <a:lstStyle/>
-          <a:p>
-            <a:r>
-              <a:rPr lang="en-US" dirty="0"/>
-              <a:t>This Subtitle is Arial in Light Orange</a:t>
-            </a:r>
-          </a:p>
-        </p:txBody>
-      </p:sp>
-    </p:spTree>
-    <p:extLst>
-      <p:ext uri="{BB962C8B-B14F-4D97-AF65-F5344CB8AC3E}">
-        <p14:creationId xmlns:p14="http://schemas.microsoft.com/office/powerpoint/2010/main" val="1549109453"/>
-      </p:ext>
-    </p:extLst>
-  </p:cSld>
-  <p:clrMapOvr>
-    <a:masterClrMapping/>
-  </p:clrMapOvr>
-  <mc:AlternateContent xmlns:mc="http://schemas.openxmlformats.org/markup-compatibility/2006" xmlns:p14="http://schemas.microsoft.com/office/powerpoint/2010/main">
-    <mc:Choice Requires="p14">
-      <p:transition spd="med" p14:dur="700">
-        <p:fade/>
-      </p:transition>
-    </mc:Choice>
-    <mc:Fallback xmlns="">
-      <p:transition spd="med">
-        <p:fade/>
-      </p:transition>
-    </mc:Fallback>
-  </mc:AlternateContent>
-</p:sld>
-</file>
-
-<file path=ppt/slides/slide14.xml><?xml version="1.0" encoding="utf-8"?>
-<p:sld xmlns:a="http://schemas.openxmlformats.org/drawingml/2006/main" xmlns:r="http://schemas.openxmlformats.org/officeDocument/2006/relationships" xmlns:p="http://schemas.openxmlformats.org/presentationml/2006/main">
-  <p:cSld>
-    <p:spTree>
-      <p:nvGrpSpPr>
-        <p:cNvPr id="1" name=""/>
-        <p:cNvGrpSpPr/>
-        <p:nvPr/>
-      </p:nvGrpSpPr>
-      <p:grpSpPr>
-        <a:xfrm>
-          <a:off x="0" y="0"/>
-          <a:ext cx="0" cy="0"/>
-          <a:chOff x="0" y="0"/>
-          <a:chExt cx="0" cy="0"/>
-        </a:xfrm>
-      </p:grpSpPr>
-      <p:sp>
-        <p:nvSpPr>
-          <p:cNvPr id="11" name="Title 10">
-            <a:extLst>
-              <a:ext uri="{FF2B5EF4-FFF2-40B4-BE49-F238E27FC236}">
-                <a16:creationId xmlns:a16="http://schemas.microsoft.com/office/drawing/2014/main" id="{A012C97D-D760-344C-8841-C4BF32B53B0C}"/>
-              </a:ext>
-            </a:extLst>
-          </p:cNvPr>
-          <p:cNvSpPr>
-            <a:spLocks noGrp="1"/>
-          </p:cNvSpPr>
-          <p:nvPr>
-            <p:ph type="title"/>
-          </p:nvPr>
-        </p:nvSpPr>
-        <p:spPr/>
-        <p:txBody>
-          <a:bodyPr/>
-          <a:lstStyle/>
-          <a:p>
-            <a:r>
-              <a:rPr lang="en-US"/>
-              <a:t>This Headline is Arial Regular in Dark Blue</a:t>
-            </a:r>
-            <a:endParaRPr lang="en-US" dirty="0"/>
-          </a:p>
-        </p:txBody>
-      </p:sp>
-      <p:sp>
-        <p:nvSpPr>
-          <p:cNvPr id="8" name="Content Placeholder 7">
-            <a:extLst>
-              <a:ext uri="{FF2B5EF4-FFF2-40B4-BE49-F238E27FC236}">
-                <a16:creationId xmlns:a16="http://schemas.microsoft.com/office/drawing/2014/main" id="{B663B186-450F-E344-81E6-B64A062B00D0}"/>
-              </a:ext>
-            </a:extLst>
-          </p:cNvPr>
-          <p:cNvSpPr>
-            <a:spLocks noGrp="1"/>
-          </p:cNvSpPr>
-          <p:nvPr>
-            <p:ph idx="1"/>
-          </p:nvPr>
-        </p:nvSpPr>
-        <p:spPr/>
-        <p:txBody>
-          <a:bodyPr>
-            <a:normAutofit lnSpcReduction="10000"/>
-          </a:bodyPr>
-          <a:lstStyle/>
-          <a:p>
-            <a:r>
-              <a:rPr lang="en-US" b="1" dirty="0">
-                <a:solidFill>
-                  <a:srgbClr val="0097D9"/>
-                </a:solidFill>
-              </a:rPr>
-              <a:t>Et </a:t>
-            </a:r>
-            <a:r>
-              <a:rPr lang="en-US" b="1" dirty="0" err="1">
-                <a:solidFill>
-                  <a:srgbClr val="0097D9"/>
-                </a:solidFill>
-              </a:rPr>
-              <a:t>alique</a:t>
-            </a:r>
-            <a:r>
-              <a:rPr lang="en-US" b="1" dirty="0">
-                <a:solidFill>
-                  <a:srgbClr val="0097D9"/>
-                </a:solidFill>
-              </a:rPr>
-              <a:t> </a:t>
-            </a:r>
-            <a:r>
-              <a:rPr lang="en-US" b="1" dirty="0" err="1">
-                <a:solidFill>
-                  <a:srgbClr val="0097D9"/>
-                </a:solidFill>
-              </a:rPr>
-              <a:t>prorenim</a:t>
-            </a:r>
-            <a:r>
-              <a:rPr lang="en-US" b="1" dirty="0">
-                <a:solidFill>
-                  <a:srgbClr val="0097D9"/>
-                </a:solidFill>
-              </a:rPr>
-              <a:t> </a:t>
-            </a:r>
-            <a:r>
-              <a:rPr lang="en-US" b="1" dirty="0" err="1">
-                <a:solidFill>
-                  <a:srgbClr val="0097D9"/>
-                </a:solidFill>
-              </a:rPr>
-              <a:t>ipsa</a:t>
-            </a:r>
-            <a:r>
-              <a:rPr lang="en-US" b="1" dirty="0">
-                <a:solidFill>
-                  <a:srgbClr val="0097D9"/>
-                </a:solidFill>
-              </a:rPr>
-              <a:t> sum </a:t>
-            </a:r>
-            <a:r>
-              <a:rPr lang="en-US" b="1" dirty="0" err="1">
-                <a:solidFill>
-                  <a:srgbClr val="0097D9"/>
-                </a:solidFill>
-              </a:rPr>
-              <a:t>etur</a:t>
-            </a:r>
-            <a:r>
-              <a:rPr lang="en-US" b="1" dirty="0">
-                <a:solidFill>
-                  <a:srgbClr val="0097D9"/>
-                </a:solidFill>
-              </a:rPr>
-              <a:t>? </a:t>
-            </a:r>
-            <a:r>
-              <a:rPr lang="en-US" dirty="0"/>
-              <a:t>Qui </a:t>
-            </a:r>
-            <a:r>
-              <a:rPr lang="en-US" dirty="0" err="1"/>
-              <a:t>consed</a:t>
-            </a:r>
-            <a:r>
-              <a:rPr lang="en-US" dirty="0"/>
-              <a:t> most </a:t>
-            </a:r>
-            <a:r>
-              <a:rPr lang="en-US" dirty="0" err="1"/>
-              <a:t>aut</a:t>
-            </a:r>
-            <a:r>
-              <a:rPr lang="en-US" dirty="0"/>
-              <a:t> </a:t>
-            </a:r>
-            <a:r>
-              <a:rPr lang="en-US" dirty="0" err="1"/>
-              <a:t>quia</a:t>
-            </a:r>
-            <a:r>
-              <a:rPr lang="en-US" dirty="0"/>
-              <a:t> is </a:t>
-            </a:r>
-            <a:r>
-              <a:rPr lang="en-US" dirty="0" err="1"/>
-              <a:t>voloria</a:t>
-            </a:r>
-            <a:r>
-              <a:rPr lang="en-US" dirty="0"/>
-              <a:t> </a:t>
-            </a:r>
-            <a:r>
-              <a:rPr lang="en-US" dirty="0" err="1"/>
-              <a:t>voluptatio</a:t>
-            </a:r>
-            <a:r>
-              <a:rPr lang="en-US" dirty="0"/>
-              <a:t> </a:t>
-            </a:r>
-            <a:r>
-              <a:rPr lang="en-US" dirty="0" err="1"/>
-              <a:t>beror</a:t>
-            </a:r>
-            <a:r>
-              <a:rPr lang="en-US" dirty="0"/>
-              <a:t> </a:t>
-            </a:r>
-            <a:r>
-              <a:rPr lang="en-US" dirty="0" err="1"/>
-              <a:t>sam</a:t>
-            </a:r>
-            <a:r>
-              <a:rPr lang="en-US" dirty="0"/>
-              <a:t>, sites </a:t>
-            </a:r>
-            <a:r>
-              <a:rPr lang="en-US" dirty="0" err="1"/>
-              <a:t>vollant</a:t>
-            </a:r>
-            <a:r>
-              <a:rPr lang="en-US" dirty="0"/>
-              <a:t>, </a:t>
-            </a:r>
-            <a:r>
-              <a:rPr lang="en-US" dirty="0" err="1"/>
-              <a:t>teceaque</a:t>
-            </a:r>
-            <a:r>
-              <a:rPr lang="en-US" dirty="0"/>
-              <a:t> </a:t>
-            </a:r>
-            <a:r>
-              <a:rPr lang="en-US" dirty="0" err="1"/>
-              <a:t>volorep</a:t>
-            </a:r>
-            <a:r>
-              <a:rPr lang="en-US" dirty="0"/>
-              <a:t> </a:t>
-            </a:r>
-            <a:r>
-              <a:rPr lang="en-US" dirty="0" err="1"/>
-              <a:t>erchil</a:t>
-            </a:r>
-            <a:r>
-              <a:rPr lang="en-US" dirty="0"/>
-              <a:t> </a:t>
-            </a:r>
-            <a:r>
-              <a:rPr lang="en-US" dirty="0" err="1"/>
-              <a:t>maximolupta</a:t>
-            </a:r>
-            <a:r>
-              <a:rPr lang="en-US" dirty="0"/>
-              <a:t> sit, quo </a:t>
-            </a:r>
-            <a:r>
-              <a:rPr lang="en-US" dirty="0" err="1"/>
-              <a:t>tem</a:t>
-            </a:r>
-            <a:r>
-              <a:rPr lang="en-US" dirty="0"/>
-              <a:t> </a:t>
-            </a:r>
-            <a:r>
-              <a:rPr lang="en-US" dirty="0" err="1"/>
-              <a:t>quunt</a:t>
-            </a:r>
-            <a:r>
-              <a:rPr lang="en-US" dirty="0"/>
-              <a:t> rem </a:t>
-            </a:r>
-            <a:r>
-              <a:rPr lang="en-US" dirty="0" err="1"/>
-              <a:t>quaeres</a:t>
-            </a:r>
-            <a:r>
-              <a:rPr lang="en-US" dirty="0"/>
-              <a:t> </a:t>
-            </a:r>
-            <a:r>
-              <a:rPr lang="en-US" dirty="0" err="1"/>
-              <a:t>ciiscia</a:t>
-            </a:r>
-            <a:r>
-              <a:rPr lang="en-US" dirty="0"/>
-              <a:t> </a:t>
-            </a:r>
-            <a:r>
-              <a:rPr lang="en-US" dirty="0" err="1"/>
-              <a:t>tenimo</a:t>
-            </a:r>
-            <a:r>
-              <a:rPr lang="en-US" dirty="0"/>
-              <a:t> </a:t>
-            </a:r>
-            <a:r>
-              <a:rPr lang="en-US" dirty="0" err="1"/>
-              <a:t>mo</a:t>
-            </a:r>
-            <a:r>
-              <a:rPr lang="en-US" dirty="0"/>
-              <a:t> </a:t>
-            </a:r>
-            <a:r>
-              <a:rPr lang="en-US" dirty="0" err="1"/>
-              <a:t>verecus</a:t>
-            </a:r>
-            <a:r>
-              <a:rPr lang="en-US" dirty="0"/>
-              <a:t>, </a:t>
-            </a:r>
-            <a:r>
-              <a:rPr lang="en-US" dirty="0" err="1"/>
-              <a:t>quis</a:t>
-            </a:r>
-            <a:r>
-              <a:rPr lang="en-US" dirty="0"/>
-              <a:t> </a:t>
-            </a:r>
-            <a:r>
-              <a:rPr lang="en-US" dirty="0" err="1"/>
-              <a:t>ut</a:t>
-            </a:r>
-            <a:r>
-              <a:rPr lang="en-US" dirty="0"/>
-              <a:t> </a:t>
-            </a:r>
-            <a:r>
-              <a:rPr lang="en-US" dirty="0" err="1"/>
-              <a:t>aliaess</a:t>
-            </a:r>
-            <a:endParaRPr lang="en-US" dirty="0"/>
-          </a:p>
-          <a:p>
-            <a:r>
-              <a:rPr lang="en-US" b="1" dirty="0">
-                <a:solidFill>
-                  <a:srgbClr val="0097D9"/>
-                </a:solidFill>
-              </a:rPr>
-              <a:t>Et </a:t>
-            </a:r>
-            <a:r>
-              <a:rPr lang="en-US" b="1" dirty="0" err="1">
-                <a:solidFill>
-                  <a:srgbClr val="0097D9"/>
-                </a:solidFill>
-              </a:rPr>
-              <a:t>alique</a:t>
-            </a:r>
-            <a:r>
-              <a:rPr lang="en-US" b="1" dirty="0">
-                <a:solidFill>
-                  <a:srgbClr val="0097D9"/>
-                </a:solidFill>
-              </a:rPr>
-              <a:t> </a:t>
-            </a:r>
-            <a:r>
-              <a:rPr lang="en-US" b="1" dirty="0" err="1">
-                <a:solidFill>
-                  <a:srgbClr val="0097D9"/>
-                </a:solidFill>
-              </a:rPr>
-              <a:t>prorenim</a:t>
-            </a:r>
-            <a:r>
-              <a:rPr lang="en-US" b="1" dirty="0">
-                <a:solidFill>
-                  <a:srgbClr val="0097D9"/>
-                </a:solidFill>
-              </a:rPr>
-              <a:t> </a:t>
-            </a:r>
-            <a:r>
-              <a:rPr lang="en-US" b="1" dirty="0" err="1">
-                <a:solidFill>
-                  <a:srgbClr val="0097D9"/>
-                </a:solidFill>
-              </a:rPr>
-              <a:t>ipsa</a:t>
-            </a:r>
-            <a:r>
-              <a:rPr lang="en-US" b="1" dirty="0">
-                <a:solidFill>
-                  <a:srgbClr val="0097D9"/>
-                </a:solidFill>
-              </a:rPr>
-              <a:t> sum </a:t>
-            </a:r>
-            <a:r>
-              <a:rPr lang="en-US" b="1" dirty="0" err="1">
-                <a:solidFill>
-                  <a:srgbClr val="0097D9"/>
-                </a:solidFill>
-              </a:rPr>
-              <a:t>etur</a:t>
-            </a:r>
-            <a:r>
-              <a:rPr lang="en-US" b="1" dirty="0">
-                <a:solidFill>
-                  <a:srgbClr val="0097D9"/>
-                </a:solidFill>
-              </a:rPr>
-              <a:t>? </a:t>
-            </a:r>
-            <a:r>
-              <a:rPr lang="en-US" dirty="0"/>
-              <a:t>Qui </a:t>
-            </a:r>
-            <a:r>
-              <a:rPr lang="en-US" dirty="0" err="1"/>
-              <a:t>consed</a:t>
-            </a:r>
-            <a:r>
-              <a:rPr lang="en-US" dirty="0"/>
-              <a:t> most </a:t>
-            </a:r>
-            <a:r>
-              <a:rPr lang="en-US" dirty="0" err="1"/>
-              <a:t>aut</a:t>
-            </a:r>
-            <a:r>
-              <a:rPr lang="en-US" dirty="0"/>
-              <a:t> </a:t>
-            </a:r>
-            <a:r>
-              <a:rPr lang="en-US" dirty="0" err="1"/>
-              <a:t>quia</a:t>
-            </a:r>
-            <a:r>
-              <a:rPr lang="en-US" dirty="0"/>
-              <a:t> is </a:t>
-            </a:r>
-            <a:r>
-              <a:rPr lang="en-US" dirty="0" err="1"/>
-              <a:t>voloria</a:t>
-            </a:r>
-            <a:r>
-              <a:rPr lang="en-US" dirty="0"/>
-              <a:t> </a:t>
-            </a:r>
-            <a:r>
-              <a:rPr lang="en-US" dirty="0" err="1"/>
-              <a:t>voluptatio</a:t>
-            </a:r>
-            <a:r>
-              <a:rPr lang="en-US" dirty="0"/>
-              <a:t> </a:t>
-            </a:r>
-            <a:r>
-              <a:rPr lang="en-US" dirty="0" err="1"/>
-              <a:t>beror</a:t>
-            </a:r>
-            <a:r>
-              <a:rPr lang="en-US" dirty="0"/>
-              <a:t> </a:t>
-            </a:r>
-            <a:r>
-              <a:rPr lang="en-US" dirty="0" err="1"/>
-              <a:t>sam</a:t>
-            </a:r>
-            <a:r>
-              <a:rPr lang="en-US" dirty="0"/>
-              <a:t>, sites </a:t>
-            </a:r>
-            <a:r>
-              <a:rPr lang="en-US" dirty="0" err="1"/>
-              <a:t>vollant</a:t>
-            </a:r>
-            <a:r>
-              <a:rPr lang="en-US" dirty="0"/>
-              <a:t>, </a:t>
-            </a:r>
-            <a:r>
-              <a:rPr lang="en-US" dirty="0" err="1"/>
-              <a:t>teceaque</a:t>
-            </a:r>
-            <a:r>
-              <a:rPr lang="en-US" dirty="0"/>
-              <a:t> </a:t>
-            </a:r>
-            <a:r>
-              <a:rPr lang="en-US" dirty="0" err="1"/>
-              <a:t>volorep</a:t>
-            </a:r>
-            <a:r>
-              <a:rPr lang="en-US" dirty="0"/>
-              <a:t> </a:t>
-            </a:r>
-            <a:r>
-              <a:rPr lang="en-US" dirty="0" err="1"/>
-              <a:t>erchil</a:t>
-            </a:r>
-            <a:r>
-              <a:rPr lang="en-US" dirty="0"/>
-              <a:t> </a:t>
-            </a:r>
-            <a:r>
-              <a:rPr lang="en-US" dirty="0" err="1"/>
-              <a:t>maximolupta</a:t>
-            </a:r>
-            <a:r>
-              <a:rPr lang="en-US" dirty="0"/>
-              <a:t> sit, quo </a:t>
-            </a:r>
-            <a:r>
-              <a:rPr lang="en-US" dirty="0" err="1"/>
-              <a:t>tem</a:t>
-            </a:r>
-            <a:r>
-              <a:rPr lang="en-US" dirty="0"/>
-              <a:t> </a:t>
-            </a:r>
-            <a:r>
-              <a:rPr lang="en-US" dirty="0" err="1"/>
-              <a:t>quunt</a:t>
-            </a:r>
-            <a:r>
-              <a:rPr lang="en-US" dirty="0"/>
-              <a:t> rem </a:t>
-            </a:r>
-            <a:r>
-              <a:rPr lang="en-US" dirty="0" err="1"/>
-              <a:t>quaeres</a:t>
-            </a:r>
-            <a:r>
-              <a:rPr lang="en-US" dirty="0"/>
-              <a:t> </a:t>
-            </a:r>
-            <a:r>
-              <a:rPr lang="en-US" dirty="0" err="1"/>
-              <a:t>ciiscia</a:t>
-            </a:r>
-            <a:r>
-              <a:rPr lang="en-US" dirty="0"/>
-              <a:t> </a:t>
-            </a:r>
-            <a:r>
-              <a:rPr lang="en-US" dirty="0" err="1"/>
-              <a:t>tenimo</a:t>
-            </a:r>
-            <a:r>
-              <a:rPr lang="en-US" dirty="0"/>
-              <a:t> </a:t>
-            </a:r>
-            <a:r>
-              <a:rPr lang="en-US" dirty="0" err="1"/>
-              <a:t>mo</a:t>
-            </a:r>
-            <a:r>
-              <a:rPr lang="en-US" dirty="0"/>
-              <a:t> </a:t>
-            </a:r>
-            <a:r>
-              <a:rPr lang="en-US" dirty="0" err="1"/>
-              <a:t>verecus</a:t>
-            </a:r>
-            <a:r>
-              <a:rPr lang="en-US" dirty="0"/>
-              <a:t>, </a:t>
-            </a:r>
-            <a:r>
-              <a:rPr lang="en-US" dirty="0" err="1"/>
-              <a:t>quis</a:t>
-            </a:r>
-            <a:r>
-              <a:rPr lang="en-US" dirty="0"/>
-              <a:t> </a:t>
-            </a:r>
-            <a:r>
-              <a:rPr lang="en-US" dirty="0" err="1"/>
-              <a:t>ut</a:t>
-            </a:r>
-            <a:r>
-              <a:rPr lang="en-US" dirty="0"/>
-              <a:t> </a:t>
-            </a:r>
-            <a:r>
-              <a:rPr lang="en-US" dirty="0" err="1"/>
-              <a:t>aliaess</a:t>
-            </a:r>
-            <a:endParaRPr lang="en-US" dirty="0"/>
-          </a:p>
-          <a:p>
-            <a:r>
-              <a:rPr lang="en-US" b="1" dirty="0">
-                <a:solidFill>
-                  <a:srgbClr val="0097D9"/>
-                </a:solidFill>
-              </a:rPr>
-              <a:t>Et </a:t>
-            </a:r>
-            <a:r>
-              <a:rPr lang="en-US" b="1" dirty="0" err="1">
-                <a:solidFill>
-                  <a:srgbClr val="0097D9"/>
-                </a:solidFill>
-              </a:rPr>
-              <a:t>alique</a:t>
-            </a:r>
-            <a:r>
-              <a:rPr lang="en-US" b="1" dirty="0">
-                <a:solidFill>
-                  <a:srgbClr val="0097D9"/>
-                </a:solidFill>
-              </a:rPr>
-              <a:t> </a:t>
-            </a:r>
-            <a:r>
-              <a:rPr lang="en-US" b="1" dirty="0" err="1">
-                <a:solidFill>
-                  <a:srgbClr val="0097D9"/>
-                </a:solidFill>
-              </a:rPr>
-              <a:t>prorenim</a:t>
-            </a:r>
-            <a:r>
-              <a:rPr lang="en-US" b="1" dirty="0">
-                <a:solidFill>
-                  <a:srgbClr val="0097D9"/>
-                </a:solidFill>
-              </a:rPr>
-              <a:t> </a:t>
-            </a:r>
-            <a:r>
-              <a:rPr lang="en-US" b="1" dirty="0" err="1">
-                <a:solidFill>
-                  <a:srgbClr val="0097D9"/>
-                </a:solidFill>
-              </a:rPr>
-              <a:t>ipsa</a:t>
-            </a:r>
-            <a:r>
-              <a:rPr lang="en-US" b="1" dirty="0">
-                <a:solidFill>
-                  <a:srgbClr val="0097D9"/>
-                </a:solidFill>
-              </a:rPr>
-              <a:t> sum </a:t>
-            </a:r>
-            <a:r>
-              <a:rPr lang="en-US" b="1" dirty="0" err="1">
-                <a:solidFill>
-                  <a:srgbClr val="0097D9"/>
-                </a:solidFill>
-              </a:rPr>
-              <a:t>etur</a:t>
-            </a:r>
-            <a:r>
-              <a:rPr lang="en-US" b="1" dirty="0">
-                <a:solidFill>
-                  <a:srgbClr val="0097D9"/>
-                </a:solidFill>
-              </a:rPr>
-              <a:t>? </a:t>
-            </a:r>
-            <a:r>
-              <a:rPr lang="en-US" dirty="0"/>
-              <a:t>Qui </a:t>
-            </a:r>
-            <a:r>
-              <a:rPr lang="en-US" dirty="0" err="1"/>
-              <a:t>consed</a:t>
-            </a:r>
-            <a:r>
-              <a:rPr lang="en-US" dirty="0"/>
-              <a:t> most </a:t>
-            </a:r>
-            <a:r>
-              <a:rPr lang="en-US" dirty="0" err="1"/>
-              <a:t>aut</a:t>
-            </a:r>
-            <a:r>
-              <a:rPr lang="en-US" dirty="0"/>
-              <a:t> </a:t>
-            </a:r>
-            <a:r>
-              <a:rPr lang="en-US" dirty="0" err="1"/>
-              <a:t>quia</a:t>
-            </a:r>
-            <a:r>
-              <a:rPr lang="en-US" dirty="0"/>
-              <a:t> is </a:t>
-            </a:r>
-            <a:r>
-              <a:rPr lang="en-US" dirty="0" err="1"/>
-              <a:t>voloria</a:t>
-            </a:r>
-            <a:r>
-              <a:rPr lang="en-US" dirty="0"/>
-              <a:t> </a:t>
-            </a:r>
-            <a:r>
-              <a:rPr lang="en-US" dirty="0" err="1"/>
-              <a:t>voluptatio</a:t>
-            </a:r>
-            <a:r>
-              <a:rPr lang="en-US" dirty="0"/>
-              <a:t> </a:t>
-            </a:r>
-            <a:r>
-              <a:rPr lang="en-US" dirty="0" err="1"/>
-              <a:t>beror</a:t>
-            </a:r>
-            <a:r>
-              <a:rPr lang="en-US" dirty="0"/>
-              <a:t> </a:t>
-            </a:r>
-            <a:r>
-              <a:rPr lang="en-US" dirty="0" err="1"/>
-              <a:t>sam</a:t>
-            </a:r>
-            <a:r>
-              <a:rPr lang="en-US" dirty="0"/>
-              <a:t>, sites </a:t>
-            </a:r>
-            <a:r>
-              <a:rPr lang="en-US" dirty="0" err="1"/>
-              <a:t>vollant</a:t>
-            </a:r>
-            <a:r>
-              <a:rPr lang="en-US" dirty="0"/>
-              <a:t>, </a:t>
-            </a:r>
-            <a:r>
-              <a:rPr lang="en-US" dirty="0" err="1"/>
-              <a:t>teceaque</a:t>
-            </a:r>
-            <a:r>
-              <a:rPr lang="en-US" dirty="0"/>
-              <a:t> </a:t>
-            </a:r>
-            <a:r>
-              <a:rPr lang="en-US" dirty="0" err="1"/>
-              <a:t>volorep</a:t>
-            </a:r>
-            <a:r>
-              <a:rPr lang="en-US" dirty="0"/>
-              <a:t> </a:t>
-            </a:r>
-            <a:r>
-              <a:rPr lang="en-US" dirty="0" err="1"/>
-              <a:t>erchil</a:t>
-            </a:r>
-            <a:r>
-              <a:rPr lang="en-US" dirty="0"/>
-              <a:t> </a:t>
-            </a:r>
-            <a:r>
-              <a:rPr lang="en-US" dirty="0" err="1"/>
-              <a:t>maximolupta</a:t>
-            </a:r>
-            <a:r>
-              <a:rPr lang="en-US" dirty="0"/>
-              <a:t> sit, quo </a:t>
-            </a:r>
-            <a:r>
-              <a:rPr lang="en-US" dirty="0" err="1"/>
-              <a:t>tem</a:t>
-            </a:r>
-            <a:r>
-              <a:rPr lang="en-US" dirty="0"/>
-              <a:t> </a:t>
-            </a:r>
-            <a:r>
-              <a:rPr lang="en-US" dirty="0" err="1"/>
-              <a:t>quunt</a:t>
-            </a:r>
-            <a:r>
-              <a:rPr lang="en-US" dirty="0"/>
-              <a:t> rem </a:t>
-            </a:r>
-            <a:r>
-              <a:rPr lang="en-US" dirty="0" err="1"/>
-              <a:t>quaeres</a:t>
-            </a:r>
-            <a:r>
-              <a:rPr lang="en-US" dirty="0"/>
-              <a:t> </a:t>
-            </a:r>
-            <a:r>
-              <a:rPr lang="en-US" dirty="0" err="1"/>
-              <a:t>ciiscia</a:t>
-            </a:r>
-            <a:r>
-              <a:rPr lang="en-US" dirty="0"/>
-              <a:t> </a:t>
-            </a:r>
-            <a:r>
-              <a:rPr lang="en-US" dirty="0" err="1"/>
-              <a:t>tenimo</a:t>
-            </a:r>
-            <a:r>
-              <a:rPr lang="en-US" dirty="0"/>
-              <a:t> </a:t>
-            </a:r>
-            <a:r>
-              <a:rPr lang="en-US" dirty="0" err="1"/>
-              <a:t>mo</a:t>
-            </a:r>
-            <a:r>
-              <a:rPr lang="en-US" dirty="0"/>
-              <a:t> </a:t>
-            </a:r>
-            <a:r>
-              <a:rPr lang="en-US" dirty="0" err="1"/>
-              <a:t>verecus</a:t>
-            </a:r>
-            <a:r>
-              <a:rPr lang="en-US" dirty="0"/>
-              <a:t>, </a:t>
-            </a:r>
-            <a:r>
-              <a:rPr lang="en-US" dirty="0" err="1"/>
-              <a:t>quis</a:t>
-            </a:r>
-            <a:r>
-              <a:rPr lang="en-US" dirty="0"/>
-              <a:t> </a:t>
-            </a:r>
-            <a:r>
-              <a:rPr lang="en-US" dirty="0" err="1"/>
-              <a:t>ut</a:t>
-            </a:r>
-            <a:r>
-              <a:rPr lang="en-US" dirty="0"/>
-              <a:t> </a:t>
-            </a:r>
-            <a:r>
-              <a:rPr lang="en-US" dirty="0" err="1"/>
-              <a:t>aliaess</a:t>
-            </a:r>
-            <a:endParaRPr lang="en-US" dirty="0"/>
-          </a:p>
-        </p:txBody>
-      </p:sp>
-      <p:sp>
-        <p:nvSpPr>
-          <p:cNvPr id="18" name="Slide Number Placeholder 5">
-            <a:extLst>
-              <a:ext uri="{FF2B5EF4-FFF2-40B4-BE49-F238E27FC236}">
-                <a16:creationId xmlns:a16="http://schemas.microsoft.com/office/drawing/2014/main" id="{10109F79-D1BF-9243-A032-356088E65B65}"/>
-              </a:ext>
-            </a:extLst>
-          </p:cNvPr>
-          <p:cNvSpPr>
-            <a:spLocks noGrp="1"/>
-          </p:cNvSpPr>
-          <p:nvPr>
-            <p:ph type="sldNum" sz="quarter" idx="12"/>
-          </p:nvPr>
-        </p:nvSpPr>
-        <p:spPr/>
-        <p:txBody>
-          <a:bodyPr/>
-          <a:lstStyle/>
-          <a:p>
-            <a:fld id="{535EF33A-04D8-4107-96E5-33B70AE88DFF}" type="slidenum">
-              <a:rPr lang="en-US" smtClean="0"/>
-              <a:pPr/>
-              <a:t>14</a:t>
-            </a:fld>
-            <a:endParaRPr lang="en-US" dirty="0"/>
-          </a:p>
-        </p:txBody>
-      </p:sp>
-      <p:pic>
-        <p:nvPicPr>
-          <p:cNvPr id="15" name="Content Placeholder 15">
-            <a:extLst>
-              <a:ext uri="{FF2B5EF4-FFF2-40B4-BE49-F238E27FC236}">
-                <a16:creationId xmlns:a16="http://schemas.microsoft.com/office/drawing/2014/main" id="{C3132149-E359-6545-A328-CEED0127B9FA}"/>
-              </a:ext>
-            </a:extLst>
-          </p:cNvPr>
-          <p:cNvPicPr>
-            <a:picLocks noGrp="1" noChangeAspect="1"/>
-          </p:cNvPicPr>
-          <p:nvPr>
-            <p:ph type="pic" sz="quarter" idx="14"/>
-          </p:nvPr>
-        </p:nvPicPr>
-        <p:blipFill>
-          <a:blip r:embed="rId2" cstate="screen">
-            <a:extLst>
-              <a:ext uri="{28A0092B-C50C-407E-A947-70E740481C1C}">
-                <a14:useLocalDpi xmlns:a14="http://schemas.microsoft.com/office/drawing/2010/main"/>
-              </a:ext>
-            </a:extLst>
-          </a:blip>
-          <a:srcRect/>
-          <a:stretch>
-            <a:fillRect/>
-          </a:stretch>
-        </p:blipFill>
-        <p:spPr/>
-      </p:pic>
-      <p:sp>
-        <p:nvSpPr>
-          <p:cNvPr id="13" name="Text Placeholder 12">
-            <a:extLst>
-              <a:ext uri="{FF2B5EF4-FFF2-40B4-BE49-F238E27FC236}">
-                <a16:creationId xmlns:a16="http://schemas.microsoft.com/office/drawing/2014/main" id="{39975BA5-F0B1-0B47-9B69-6895D35EB3FC}"/>
-              </a:ext>
-            </a:extLst>
-          </p:cNvPr>
-          <p:cNvSpPr>
-            <a:spLocks noGrp="1"/>
-          </p:cNvSpPr>
-          <p:nvPr>
-            <p:ph type="body" sz="quarter" idx="13"/>
-          </p:nvPr>
-        </p:nvSpPr>
-        <p:spPr/>
-        <p:txBody>
-          <a:bodyPr/>
-          <a:lstStyle/>
-          <a:p>
-            <a:r>
-              <a:rPr lang="en-US" dirty="0"/>
-              <a:t>This Subtitle is Arial in Light Orange</a:t>
-            </a:r>
-          </a:p>
-        </p:txBody>
-      </p:sp>
-      <p:sp>
-        <p:nvSpPr>
-          <p:cNvPr id="21" name="Text Placeholder 20">
-            <a:extLst>
-              <a:ext uri="{FF2B5EF4-FFF2-40B4-BE49-F238E27FC236}">
-                <a16:creationId xmlns:a16="http://schemas.microsoft.com/office/drawing/2014/main" id="{51D40745-204A-EE4A-8428-54FC0DDCA159}"/>
-              </a:ext>
-            </a:extLst>
-          </p:cNvPr>
-          <p:cNvSpPr>
-            <a:spLocks noGrp="1"/>
-          </p:cNvSpPr>
-          <p:nvPr>
-            <p:ph type="body" sz="quarter" idx="15"/>
-          </p:nvPr>
-        </p:nvSpPr>
-        <p:spPr/>
-        <p:txBody>
-          <a:bodyPr/>
-          <a:lstStyle/>
-          <a:p>
-            <a:r>
-              <a:rPr lang="en-US" dirty="0" err="1"/>
-              <a:t>vollant</a:t>
-            </a:r>
-            <a:r>
-              <a:rPr lang="en-US" dirty="0"/>
-              <a:t>, </a:t>
-            </a:r>
-            <a:r>
-              <a:rPr lang="en-US" dirty="0" err="1"/>
-              <a:t>teceaque</a:t>
-            </a:r>
-            <a:r>
-              <a:rPr lang="en-US" dirty="0"/>
-              <a:t> </a:t>
-            </a:r>
-            <a:r>
-              <a:rPr lang="en-US" dirty="0" err="1"/>
-              <a:t>volorep</a:t>
-            </a:r>
-            <a:r>
-              <a:rPr lang="en-US" dirty="0"/>
-              <a:t> </a:t>
-            </a:r>
-            <a:r>
-              <a:rPr lang="en-US" dirty="0" err="1"/>
-              <a:t>erchil</a:t>
-            </a:r>
-            <a:r>
-              <a:rPr lang="en-US" dirty="0"/>
-              <a:t> </a:t>
-            </a:r>
-            <a:r>
-              <a:rPr lang="en-US" dirty="0" err="1"/>
-              <a:t>maximolupta</a:t>
-            </a:r>
-            <a:r>
-              <a:rPr lang="en-US" dirty="0"/>
-              <a:t> sit, quo </a:t>
-            </a:r>
-            <a:r>
-              <a:rPr lang="en-US" dirty="0" err="1"/>
-              <a:t>tem</a:t>
-            </a:r>
-            <a:r>
-              <a:rPr lang="en-US" dirty="0"/>
-              <a:t> </a:t>
-            </a:r>
-            <a:r>
-              <a:rPr lang="en-US" dirty="0" err="1"/>
-              <a:t>quunt</a:t>
-            </a:r>
-            <a:r>
-              <a:rPr lang="en-US" dirty="0"/>
-              <a:t> rem </a:t>
-            </a:r>
-            <a:r>
-              <a:rPr lang="en-US" dirty="0" err="1"/>
-              <a:t>quaeres</a:t>
-            </a:r>
-            <a:r>
-              <a:rPr lang="en-US" dirty="0"/>
-              <a:t> </a:t>
-            </a:r>
-            <a:r>
-              <a:rPr lang="en-US" dirty="0" err="1"/>
-              <a:t>ciiscia</a:t>
-            </a:r>
-            <a:r>
-              <a:rPr lang="en-US" dirty="0"/>
-              <a:t> </a:t>
-            </a:r>
-            <a:r>
-              <a:rPr lang="en-US" dirty="0" err="1"/>
-              <a:t>tenimo</a:t>
-            </a:r>
-            <a:r>
-              <a:rPr lang="en-US" dirty="0"/>
-              <a:t> </a:t>
-            </a:r>
-            <a:r>
-              <a:rPr lang="en-US" dirty="0" err="1"/>
-              <a:t>mo</a:t>
-            </a:r>
-            <a:r>
-              <a:rPr lang="en-US" dirty="0"/>
-              <a:t> </a:t>
-            </a:r>
-            <a:r>
-              <a:rPr lang="en-US" dirty="0" err="1"/>
-              <a:t>verecus</a:t>
-            </a:r>
-            <a:r>
-              <a:rPr lang="en-US" dirty="0"/>
-              <a:t>, </a:t>
-            </a:r>
-            <a:r>
-              <a:rPr lang="en-US" dirty="0" err="1"/>
-              <a:t>quis</a:t>
-            </a:r>
-            <a:r>
-              <a:rPr lang="en-US" dirty="0"/>
-              <a:t> </a:t>
-            </a:r>
-            <a:r>
-              <a:rPr lang="en-US" dirty="0" err="1"/>
-              <a:t>ut</a:t>
-            </a:r>
-            <a:r>
-              <a:rPr lang="en-US" dirty="0"/>
-              <a:t> </a:t>
-            </a:r>
-            <a:r>
-              <a:rPr lang="en-US" dirty="0" err="1"/>
-              <a:t>aliaess</a:t>
-            </a:r>
-            <a:endParaRPr lang="en-US" dirty="0"/>
-          </a:p>
-        </p:txBody>
-      </p:sp>
-    </p:spTree>
-    <p:extLst>
-      <p:ext uri="{BB962C8B-B14F-4D97-AF65-F5344CB8AC3E}">
-        <p14:creationId xmlns:p14="http://schemas.microsoft.com/office/powerpoint/2010/main" val="673309395"/>
-      </p:ext>
-    </p:extLst>
-  </p:cSld>
-  <p:clrMapOvr>
-    <a:masterClrMapping/>
-  </p:clrMapOvr>
-  <mc:AlternateContent xmlns:mc="http://schemas.openxmlformats.org/markup-compatibility/2006" xmlns:p14="http://schemas.microsoft.com/office/powerpoint/2010/main">
-    <mc:Choice Requires="p14">
-      <p:transition spd="med" p14:dur="700">
-        <p:fade/>
-      </p:transition>
-    </mc:Choice>
-    <mc:Fallback xmlns="">
-      <p:transition spd="med">
-        <p:fade/>
-      </p:transition>
-    </mc:Fallback>
-  </mc:AlternateContent>
-</p:sld>
-</file>
-
-<file path=ppt/slides/slide15.xml><?xml version="1.0" encoding="utf-8"?>
-<p:sld xmlns:a="http://schemas.openxmlformats.org/drawingml/2006/main" xmlns:r="http://schemas.openxmlformats.org/officeDocument/2006/relationships" xmlns:p="http://schemas.openxmlformats.org/presentationml/2006/main">
-  <p:cSld>
-    <p:spTree>
-      <p:nvGrpSpPr>
-        <p:cNvPr id="1" name=""/>
-        <p:cNvGrpSpPr/>
-        <p:nvPr/>
-      </p:nvGrpSpPr>
-      <p:grpSpPr>
-        <a:xfrm>
-          <a:off x="0" y="0"/>
-          <a:ext cx="0" cy="0"/>
-          <a:chOff x="0" y="0"/>
-          <a:chExt cx="0" cy="0"/>
-        </a:xfrm>
-      </p:grpSpPr>
-      <p:sp>
-        <p:nvSpPr>
-          <p:cNvPr id="5" name="Title 4">
-            <a:extLst>
-              <a:ext uri="{FF2B5EF4-FFF2-40B4-BE49-F238E27FC236}">
-                <a16:creationId xmlns:a16="http://schemas.microsoft.com/office/drawing/2014/main" id="{D1D110B9-BD7B-0E4C-ACAA-096B0B004C31}"/>
-              </a:ext>
-            </a:extLst>
-          </p:cNvPr>
-          <p:cNvSpPr>
-            <a:spLocks noGrp="1"/>
-          </p:cNvSpPr>
-          <p:nvPr>
-            <p:ph type="title"/>
-          </p:nvPr>
-        </p:nvSpPr>
-        <p:spPr/>
-        <p:txBody>
-          <a:bodyPr/>
-          <a:lstStyle/>
-          <a:p>
-            <a:r>
-              <a:rPr lang="en-US" dirty="0"/>
-              <a:t>This Headline is Arial Regular in Dark Blue</a:t>
-            </a:r>
-          </a:p>
-        </p:txBody>
-      </p:sp>
-      <p:sp>
-        <p:nvSpPr>
-          <p:cNvPr id="6" name="Text Placeholder 5">
-            <a:extLst>
-              <a:ext uri="{FF2B5EF4-FFF2-40B4-BE49-F238E27FC236}">
-                <a16:creationId xmlns:a16="http://schemas.microsoft.com/office/drawing/2014/main" id="{1A2FE69E-83E7-1A45-B0EA-41ACE922B915}"/>
-              </a:ext>
-            </a:extLst>
-          </p:cNvPr>
-          <p:cNvSpPr>
-            <a:spLocks noGrp="1"/>
-          </p:cNvSpPr>
-          <p:nvPr>
-            <p:ph type="body" sz="quarter" idx="13"/>
-          </p:nvPr>
-        </p:nvSpPr>
-        <p:spPr>
-          <a:xfrm>
-            <a:off x="504825" y="1267809"/>
-            <a:ext cx="8134350" cy="687368"/>
-          </a:xfrm>
-        </p:spPr>
-        <p:txBody>
-          <a:bodyPr/>
-          <a:lstStyle/>
-          <a:p>
-            <a:r>
-              <a:rPr lang="en-US" dirty="0"/>
-              <a:t>This Subtitle is Arial in Light Orange</a:t>
-            </a:r>
-          </a:p>
-          <a:p>
-            <a:endParaRPr lang="en-US" dirty="0"/>
-          </a:p>
-        </p:txBody>
-      </p:sp>
-      <p:graphicFrame>
-        <p:nvGraphicFramePr>
-          <p:cNvPr id="9" name="Table 8">
-            <a:extLst>
-              <a:ext uri="{FF2B5EF4-FFF2-40B4-BE49-F238E27FC236}">
-                <a16:creationId xmlns:a16="http://schemas.microsoft.com/office/drawing/2014/main" id="{5FC501F5-9AE0-B44B-8D24-170502F48B34}"/>
-              </a:ext>
-            </a:extLst>
-          </p:cNvPr>
-          <p:cNvGraphicFramePr>
-            <a:graphicFrameLocks noGrp="1"/>
-          </p:cNvGraphicFramePr>
-          <p:nvPr>
-            <p:extLst>
-              <p:ext uri="{D42A27DB-BD31-4B8C-83A1-F6EECF244321}">
-                <p14:modId xmlns:p14="http://schemas.microsoft.com/office/powerpoint/2010/main" val="3733447923"/>
-              </p:ext>
-            </p:extLst>
-          </p:nvPr>
-        </p:nvGraphicFramePr>
-        <p:xfrm>
-          <a:off x="504826" y="1993882"/>
-          <a:ext cx="8134350" cy="2534952"/>
-        </p:xfrm>
-        <a:graphic>
-          <a:graphicData uri="http://schemas.openxmlformats.org/drawingml/2006/table">
-            <a:tbl>
-              <a:tblPr firstRow="1" bandRow="1">
-                <a:tableStyleId>{5C22544A-7EE6-4342-B048-85BDC9FD1C3A}</a:tableStyleId>
-              </a:tblPr>
-              <a:tblGrid>
-                <a:gridCol w="2043542">
-                  <a:extLst>
-                    <a:ext uri="{9D8B030D-6E8A-4147-A177-3AD203B41FA5}">
-                      <a16:colId xmlns:a16="http://schemas.microsoft.com/office/drawing/2014/main" val="20000"/>
-                    </a:ext>
-                  </a:extLst>
-                </a:gridCol>
-                <a:gridCol w="2043542">
-                  <a:extLst>
-                    <a:ext uri="{9D8B030D-6E8A-4147-A177-3AD203B41FA5}">
-                      <a16:colId xmlns:a16="http://schemas.microsoft.com/office/drawing/2014/main" val="20001"/>
-                    </a:ext>
-                  </a:extLst>
-                </a:gridCol>
-                <a:gridCol w="4047266">
-                  <a:extLst>
-                    <a:ext uri="{9D8B030D-6E8A-4147-A177-3AD203B41FA5}">
-                      <a16:colId xmlns:a16="http://schemas.microsoft.com/office/drawing/2014/main" val="20002"/>
-                    </a:ext>
-                  </a:extLst>
-                </a:gridCol>
-              </a:tblGrid>
-              <a:tr h="335250">
-                <a:tc>
-                  <a:txBody>
-                    <a:bodyPr/>
-                    <a:lstStyle/>
-                    <a:p>
-                      <a:r>
-                        <a:rPr lang="en-US" sz="900" b="1" i="0" dirty="0">
-                          <a:solidFill>
-                            <a:srgbClr val="002D56"/>
-                          </a:solidFill>
-                          <a:latin typeface="+mn-lt"/>
-                          <a:ea typeface="Calibri" charset="0"/>
-                          <a:cs typeface="Calibri" charset="0"/>
-                        </a:rPr>
-                        <a:t>Subhead</a:t>
-                      </a:r>
-                    </a:p>
-                  </a:txBody>
-                  <a:tcPr anchor="ctr">
-                    <a:lnL w="12700" cap="flat" cmpd="sng" algn="ctr">
-                      <a:noFill/>
-                      <a:prstDash val="solid"/>
-                      <a:round/>
-                      <a:headEnd type="none" w="med" len="med"/>
-                      <a:tailEnd type="none" w="med" len="med"/>
-                    </a:lnL>
-                    <a:lnR w="12700" cap="flat" cmpd="sng" algn="ctr">
-                      <a:noFill/>
-                      <a:prstDash val="solid"/>
-                      <a:round/>
-                      <a:headEnd type="none" w="med" len="med"/>
-                      <a:tailEnd type="none" w="med" len="med"/>
-                    </a:lnR>
-                    <a:lnT w="6350" cap="flat" cmpd="sng" algn="ctr">
-                      <a:noFill/>
-                      <a:prstDash val="solid"/>
-                      <a:round/>
-                      <a:headEnd type="none" w="med" len="med"/>
-                      <a:tailEnd type="none" w="med" len="med"/>
-                    </a:lnT>
-                    <a:lnB w="6350" cap="flat" cmpd="sng" algn="ctr">
-                      <a:noFill/>
-                      <a:prstDash val="solid"/>
-                      <a:round/>
-                      <a:headEnd type="none" w="med" len="med"/>
-                      <a:tailEnd type="none" w="med" len="med"/>
-                    </a:lnB>
-                    <a:lnTlToBr w="12700" cmpd="sng">
-                      <a:noFill/>
-                      <a:prstDash val="solid"/>
-                    </a:lnTlToBr>
-                    <a:lnBlToTr w="12700" cmpd="sng">
-                      <a:noFill/>
-                      <a:prstDash val="solid"/>
-                    </a:lnBlToTr>
-                    <a:solidFill>
-                      <a:srgbClr val="95D9F8"/>
-                    </a:solidFill>
-                  </a:tcPr>
-                </a:tc>
-                <a:tc>
-                  <a:txBody>
-                    <a:bodyPr/>
-                    <a:lstStyle/>
-                    <a:p>
-                      <a:r>
-                        <a:rPr lang="en-US" sz="900" b="1" i="0" dirty="0">
-                          <a:solidFill>
-                            <a:schemeClr val="bg1"/>
-                          </a:solidFill>
-                          <a:latin typeface="+mn-lt"/>
-                          <a:ea typeface="Calibri" charset="0"/>
-                          <a:cs typeface="Calibri" charset="0"/>
-                        </a:rPr>
-                        <a:t>Subhead</a:t>
-                      </a:r>
-                    </a:p>
-                  </a:txBody>
-                  <a:tcPr anchor="ctr">
-                    <a:lnL w="12700" cap="flat" cmpd="sng" algn="ctr">
-                      <a:noFill/>
-                      <a:prstDash val="solid"/>
-                      <a:round/>
-                      <a:headEnd type="none" w="med" len="med"/>
-                      <a:tailEnd type="none" w="med" len="med"/>
-                    </a:lnL>
-                    <a:lnR w="12700" cap="flat" cmpd="sng" algn="ctr">
-                      <a:noFill/>
-                      <a:prstDash val="solid"/>
-                      <a:round/>
-                      <a:headEnd type="none" w="med" len="med"/>
-                      <a:tailEnd type="none" w="med" len="med"/>
-                    </a:lnR>
-                    <a:lnT w="6350" cap="flat" cmpd="sng" algn="ctr">
-                      <a:noFill/>
-                      <a:prstDash val="solid"/>
-                      <a:round/>
-                      <a:headEnd type="none" w="med" len="med"/>
-                      <a:tailEnd type="none" w="med" len="med"/>
-                    </a:lnT>
-                    <a:lnB w="6350" cap="flat" cmpd="sng" algn="ctr">
-                      <a:noFill/>
-                      <a:prstDash val="solid"/>
-                      <a:round/>
-                      <a:headEnd type="none" w="med" len="med"/>
-                      <a:tailEnd type="none" w="med" len="med"/>
-                    </a:lnB>
-                    <a:lnTlToBr w="12700" cmpd="sng">
-                      <a:noFill/>
-                      <a:prstDash val="solid"/>
-                    </a:lnTlToBr>
-                    <a:lnBlToTr w="12700" cmpd="sng">
-                      <a:noFill/>
-                      <a:prstDash val="solid"/>
-                    </a:lnBlToTr>
-                    <a:solidFill>
-                      <a:srgbClr val="002D56"/>
-                    </a:solidFill>
-                  </a:tcPr>
-                </a:tc>
-                <a:tc>
-                  <a:txBody>
-                    <a:bodyPr/>
-                    <a:lstStyle/>
-                    <a:p>
-                      <a:r>
-                        <a:rPr lang="en-US" sz="900" b="1" i="0" dirty="0">
-                          <a:solidFill>
-                            <a:schemeClr val="bg1"/>
-                          </a:solidFill>
-                          <a:latin typeface="+mn-lt"/>
-                          <a:ea typeface="Calibri" charset="0"/>
-                          <a:cs typeface="Calibri" charset="0"/>
-                        </a:rPr>
-                        <a:t>Subhead</a:t>
-                      </a:r>
-                    </a:p>
-                  </a:txBody>
-                  <a:tcPr anchor="ctr">
-                    <a:lnL w="12700" cap="flat" cmpd="sng" algn="ctr">
-                      <a:noFill/>
-                      <a:prstDash val="solid"/>
-                      <a:round/>
-                      <a:headEnd type="none" w="med" len="med"/>
-                      <a:tailEnd type="none" w="med" len="med"/>
-                    </a:lnL>
-                    <a:lnR w="12700" cap="flat" cmpd="sng" algn="ctr">
-                      <a:noFill/>
-                      <a:prstDash val="solid"/>
-                      <a:round/>
-                      <a:headEnd type="none" w="med" len="med"/>
-                      <a:tailEnd type="none" w="med" len="med"/>
-                    </a:lnR>
-                    <a:lnT w="6350" cap="flat" cmpd="sng" algn="ctr">
-                      <a:noFill/>
-                      <a:prstDash val="solid"/>
-                      <a:round/>
-                      <a:headEnd type="none" w="med" len="med"/>
-                      <a:tailEnd type="none" w="med" len="med"/>
-                    </a:lnT>
-                    <a:lnB w="6350" cap="flat" cmpd="sng" algn="ctr">
-                      <a:noFill/>
-                      <a:prstDash val="solid"/>
-                      <a:round/>
-                      <a:headEnd type="none" w="med" len="med"/>
-                      <a:tailEnd type="none" w="med" len="med"/>
-                    </a:lnB>
-                    <a:lnTlToBr w="12700" cmpd="sng">
-                      <a:noFill/>
-                      <a:prstDash val="solid"/>
-                    </a:lnTlToBr>
-                    <a:lnBlToTr w="12700" cmpd="sng">
-                      <a:noFill/>
-                      <a:prstDash val="solid"/>
-                    </a:lnBlToTr>
-                    <a:solidFill>
-                      <a:srgbClr val="002D56"/>
-                    </a:solidFill>
-                  </a:tcPr>
-                </a:tc>
-                <a:extLst>
-                  <a:ext uri="{0D108BD9-81ED-4DB2-BD59-A6C34878D82A}">
-                    <a16:rowId xmlns:a16="http://schemas.microsoft.com/office/drawing/2014/main" val="10000"/>
-                  </a:ext>
-                </a:extLst>
-              </a:tr>
-              <a:tr h="366617">
-                <a:tc>
-                  <a:txBody>
-                    <a:bodyPr/>
-                    <a:lstStyle/>
-                    <a:p>
-                      <a:r>
-                        <a:rPr lang="en-US" sz="800" b="0" i="0" dirty="0">
-                          <a:solidFill>
-                            <a:schemeClr val="tx1"/>
-                          </a:solidFill>
-                          <a:latin typeface="+mn-lt"/>
-                          <a:ea typeface="Calibri Light" charset="0"/>
-                          <a:cs typeface="Calibri Light" charset="0"/>
-                        </a:rPr>
-                        <a:t>Body copy</a:t>
-                      </a:r>
-                    </a:p>
-                  </a:txBody>
-                  <a:tcPr anchor="ctr">
-                    <a:lnL w="12700" cap="flat" cmpd="sng" algn="ctr">
-                      <a:noFill/>
-                      <a:prstDash val="solid"/>
-                      <a:round/>
-                      <a:headEnd type="none" w="med" len="med"/>
-                      <a:tailEnd type="none" w="med" len="med"/>
-                    </a:lnL>
-                    <a:lnR w="12700" cap="flat" cmpd="sng" algn="ctr">
-                      <a:noFill/>
-                      <a:prstDash val="solid"/>
-                      <a:round/>
-                      <a:headEnd type="none" w="med" len="med"/>
-                      <a:tailEnd type="none" w="med" len="med"/>
-                    </a:lnR>
-                    <a:lnT w="6350" cap="flat" cmpd="sng" algn="ctr">
-                      <a:noFill/>
-                      <a:prstDash val="solid"/>
-                      <a:round/>
-                      <a:headEnd type="none" w="med" len="med"/>
-                      <a:tailEnd type="none" w="med" len="med"/>
-                    </a:lnT>
-                    <a:lnB w="12700" cap="flat" cmpd="sng" algn="ctr">
-                      <a:noFill/>
-                      <a:prstDash val="solid"/>
-                      <a:round/>
-                      <a:headEnd type="none" w="med" len="med"/>
-                      <a:tailEnd type="none" w="med" len="med"/>
-                    </a:lnB>
-                    <a:lnTlToBr w="12700" cmpd="sng">
-                      <a:noFill/>
-                      <a:prstDash val="solid"/>
-                    </a:lnTlToBr>
-                    <a:lnBlToTr w="12700" cmpd="sng">
-                      <a:noFill/>
-                      <a:prstDash val="solid"/>
-                    </a:lnBlToTr>
-                    <a:solidFill>
-                      <a:schemeClr val="bg1">
-                        <a:lumMod val="95000"/>
-                      </a:schemeClr>
-                    </a:solidFill>
-                  </a:tcPr>
-                </a:tc>
-                <a:tc>
-                  <a:txBody>
-                    <a:bodyPr/>
-                    <a:lstStyle/>
-                    <a:p>
-                      <a:r>
-                        <a:rPr lang="en-US" sz="800" b="0" i="0" dirty="0">
-                          <a:solidFill>
-                            <a:schemeClr val="tx1"/>
-                          </a:solidFill>
-                          <a:latin typeface="+mn-lt"/>
-                          <a:ea typeface="Calibri Light" charset="0"/>
-                          <a:cs typeface="Calibri Light" charset="0"/>
-                        </a:rPr>
-                        <a:t>Body copy</a:t>
-                      </a:r>
-                    </a:p>
-                  </a:txBody>
-                  <a:tcPr anchor="ctr">
-                    <a:lnL w="12700" cap="flat" cmpd="sng" algn="ctr">
-                      <a:noFill/>
-                      <a:prstDash val="solid"/>
-                      <a:round/>
-                      <a:headEnd type="none" w="med" len="med"/>
-                      <a:tailEnd type="none" w="med" len="med"/>
-                    </a:lnL>
-                    <a:lnR w="12700" cap="flat" cmpd="sng" algn="ctr">
-                      <a:noFill/>
-                      <a:prstDash val="solid"/>
-                      <a:round/>
-                      <a:headEnd type="none" w="med" len="med"/>
-                      <a:tailEnd type="none" w="med" len="med"/>
-                    </a:lnR>
-                    <a:lnT w="6350" cap="flat" cmpd="sng" algn="ctr">
-                      <a:noFill/>
-                      <a:prstDash val="solid"/>
-                      <a:round/>
-                      <a:headEnd type="none" w="med" len="med"/>
-                      <a:tailEnd type="none" w="med" len="med"/>
-                    </a:lnT>
-                    <a:lnB w="12700" cap="flat" cmpd="sng" algn="ctr">
-                      <a:noFill/>
-                      <a:prstDash val="solid"/>
-                      <a:round/>
-                      <a:headEnd type="none" w="med" len="med"/>
-                      <a:tailEnd type="none" w="med" len="med"/>
-                    </a:lnB>
-                    <a:lnTlToBr w="12700" cmpd="sng">
-                      <a:noFill/>
-                      <a:prstDash val="solid"/>
-                    </a:lnTlToBr>
-                    <a:lnBlToTr w="12700" cmpd="sng">
-                      <a:noFill/>
-                      <a:prstDash val="solid"/>
-                    </a:lnBlToTr>
-                    <a:solidFill>
-                      <a:schemeClr val="bg1">
-                        <a:lumMod val="95000"/>
-                      </a:schemeClr>
-                    </a:solidFill>
-                  </a:tcPr>
-                </a:tc>
-                <a:tc>
-                  <a:txBody>
-                    <a:bodyPr/>
-                    <a:lstStyle/>
-                    <a:p>
-                      <a:r>
-                        <a:rPr lang="en-US" sz="800" b="0" i="0" dirty="0">
-                          <a:solidFill>
-                            <a:schemeClr val="tx1"/>
-                          </a:solidFill>
-                          <a:latin typeface="+mn-lt"/>
-                          <a:ea typeface="Calibri Light" charset="0"/>
-                          <a:cs typeface="Calibri Light" charset="0"/>
-                        </a:rPr>
-                        <a:t>Body copy</a:t>
-                      </a:r>
-                    </a:p>
-                  </a:txBody>
-                  <a:tcPr anchor="ctr">
-                    <a:lnL w="12700" cap="flat" cmpd="sng" algn="ctr">
-                      <a:noFill/>
-                      <a:prstDash val="solid"/>
-                      <a:round/>
-                      <a:headEnd type="none" w="med" len="med"/>
-                      <a:tailEnd type="none" w="med" len="med"/>
-                    </a:lnL>
-                    <a:lnR w="12700" cap="flat" cmpd="sng" algn="ctr">
-                      <a:noFill/>
-                      <a:prstDash val="solid"/>
-                      <a:round/>
-                      <a:headEnd type="none" w="med" len="med"/>
-                      <a:tailEnd type="none" w="med" len="med"/>
-                    </a:lnR>
-                    <a:lnT w="6350" cap="flat" cmpd="sng" algn="ctr">
-                      <a:noFill/>
-                      <a:prstDash val="solid"/>
-                      <a:round/>
-                      <a:headEnd type="none" w="med" len="med"/>
-                      <a:tailEnd type="none" w="med" len="med"/>
-                    </a:lnT>
-                    <a:lnB w="12700" cap="flat" cmpd="sng" algn="ctr">
-                      <a:noFill/>
-                      <a:prstDash val="solid"/>
-                      <a:round/>
-                      <a:headEnd type="none" w="med" len="med"/>
-                      <a:tailEnd type="none" w="med" len="med"/>
-                    </a:lnB>
-                    <a:lnTlToBr w="12700" cmpd="sng">
-                      <a:noFill/>
-                      <a:prstDash val="solid"/>
-                    </a:lnTlToBr>
-                    <a:lnBlToTr w="12700" cmpd="sng">
-                      <a:noFill/>
-                      <a:prstDash val="solid"/>
-                    </a:lnBlToTr>
-                    <a:solidFill>
-                      <a:schemeClr val="bg1">
-                        <a:lumMod val="95000"/>
-                      </a:schemeClr>
-                    </a:solidFill>
-                  </a:tcPr>
-                </a:tc>
-                <a:extLst>
-                  <a:ext uri="{0D108BD9-81ED-4DB2-BD59-A6C34878D82A}">
-                    <a16:rowId xmlns:a16="http://schemas.microsoft.com/office/drawing/2014/main" val="10001"/>
-                  </a:ext>
-                </a:extLst>
-              </a:tr>
-              <a:tr h="366617">
-                <a:tc>
-                  <a:txBody>
-                    <a:bodyPr/>
-                    <a:lstStyle/>
-                    <a:p>
-                      <a:r>
-                        <a:rPr lang="en-US" sz="800" b="0" i="0" dirty="0">
-                          <a:solidFill>
-                            <a:schemeClr val="tx1"/>
-                          </a:solidFill>
-                          <a:latin typeface="+mn-lt"/>
-                          <a:ea typeface="Calibri Light" charset="0"/>
-                          <a:cs typeface="Calibri Light" charset="0"/>
-                        </a:rPr>
-                        <a:t>Body copy</a:t>
-                      </a:r>
-                    </a:p>
-                  </a:txBody>
-                  <a:tcPr anchor="ctr">
-                    <a:lnL w="12700" cap="flat" cmpd="sng" algn="ctr">
-                      <a:noFill/>
-                      <a:prstDash val="solid"/>
-                      <a:round/>
-                      <a:headEnd type="none" w="med" len="med"/>
-                      <a:tailEnd type="none" w="med" len="med"/>
-                    </a:lnL>
-                    <a:lnR w="12700" cap="flat" cmpd="sng" algn="ctr">
-                      <a:noFill/>
-                      <a:prstDash val="solid"/>
-                      <a:round/>
-                      <a:headEnd type="none" w="med" len="med"/>
-                      <a:tailEnd type="none" w="med" len="med"/>
-                    </a:lnR>
-                    <a:lnT w="12700" cap="flat" cmpd="sng" algn="ctr">
-                      <a:noFill/>
-                      <a:prstDash val="solid"/>
-                      <a:round/>
-                      <a:headEnd type="none" w="med" len="med"/>
-                      <a:tailEnd type="none" w="med" len="med"/>
-                    </a:lnT>
-                    <a:lnB w="12700" cap="flat" cmpd="sng" algn="ctr">
-                      <a:noFill/>
-                      <a:prstDash val="solid"/>
-                      <a:round/>
-                      <a:headEnd type="none" w="med" len="med"/>
-                      <a:tailEnd type="none" w="med" len="med"/>
-                    </a:lnB>
-                    <a:lnTlToBr w="12700" cmpd="sng">
-                      <a:noFill/>
-                      <a:prstDash val="solid"/>
-                    </a:lnTlToBr>
-                    <a:lnBlToTr w="12700" cmpd="sng">
-                      <a:noFill/>
-                      <a:prstDash val="solid"/>
-                    </a:lnBlToTr>
-                    <a:solidFill>
-                      <a:schemeClr val="bg1"/>
-                    </a:solidFill>
-                  </a:tcPr>
-                </a:tc>
-                <a:tc>
-                  <a:txBody>
-                    <a:bodyPr/>
-                    <a:lstStyle/>
-                    <a:p>
-                      <a:r>
-                        <a:rPr lang="en-US" sz="800" b="0" i="0" dirty="0">
-                          <a:solidFill>
-                            <a:schemeClr val="tx1"/>
-                          </a:solidFill>
-                          <a:latin typeface="+mn-lt"/>
-                          <a:ea typeface="Calibri Light" charset="0"/>
-                          <a:cs typeface="Calibri Light" charset="0"/>
-                        </a:rPr>
-                        <a:t>Body copy</a:t>
-                      </a:r>
-                    </a:p>
-                  </a:txBody>
-                  <a:tcPr anchor="ctr">
-                    <a:lnL w="12700" cap="flat" cmpd="sng" algn="ctr">
-                      <a:noFill/>
-                      <a:prstDash val="solid"/>
-                      <a:round/>
-                      <a:headEnd type="none" w="med" len="med"/>
-                      <a:tailEnd type="none" w="med" len="med"/>
-                    </a:lnL>
-                    <a:lnR w="12700" cap="flat" cmpd="sng" algn="ctr">
-                      <a:noFill/>
-                      <a:prstDash val="solid"/>
-                      <a:round/>
-                      <a:headEnd type="none" w="med" len="med"/>
-                      <a:tailEnd type="none" w="med" len="med"/>
-                    </a:lnR>
-                    <a:lnT w="12700" cap="flat" cmpd="sng" algn="ctr">
-                      <a:noFill/>
-                      <a:prstDash val="solid"/>
-                      <a:round/>
-                      <a:headEnd type="none" w="med" len="med"/>
-                      <a:tailEnd type="none" w="med" len="med"/>
-                    </a:lnT>
-                    <a:lnB w="12700" cap="flat" cmpd="sng" algn="ctr">
-                      <a:noFill/>
-                      <a:prstDash val="solid"/>
-                      <a:round/>
-                      <a:headEnd type="none" w="med" len="med"/>
-                      <a:tailEnd type="none" w="med" len="med"/>
-                    </a:lnB>
-                    <a:lnTlToBr w="12700" cmpd="sng">
-                      <a:noFill/>
-                      <a:prstDash val="solid"/>
-                    </a:lnTlToBr>
-                    <a:lnBlToTr w="12700" cmpd="sng">
-                      <a:noFill/>
-                      <a:prstDash val="solid"/>
-                    </a:lnBlToTr>
-                    <a:solidFill>
-                      <a:schemeClr val="bg1"/>
-                    </a:solidFill>
-                  </a:tcPr>
-                </a:tc>
-                <a:tc>
-                  <a:txBody>
-                    <a:bodyPr/>
-                    <a:lstStyle/>
-                    <a:p>
-                      <a:r>
-                        <a:rPr lang="en-US" sz="800" b="0" i="0" dirty="0">
-                          <a:solidFill>
-                            <a:schemeClr val="tx1"/>
-                          </a:solidFill>
-                          <a:latin typeface="+mn-lt"/>
-                          <a:ea typeface="Calibri Light" charset="0"/>
-                          <a:cs typeface="Calibri Light" charset="0"/>
-                        </a:rPr>
-                        <a:t>Body copy</a:t>
-                      </a:r>
-                    </a:p>
-                  </a:txBody>
-                  <a:tcPr anchor="ctr">
-                    <a:lnL w="12700" cap="flat" cmpd="sng" algn="ctr">
-                      <a:noFill/>
-                      <a:prstDash val="solid"/>
-                      <a:round/>
-                      <a:headEnd type="none" w="med" len="med"/>
-                      <a:tailEnd type="none" w="med" len="med"/>
-                    </a:lnL>
-                    <a:lnR w="12700" cap="flat" cmpd="sng" algn="ctr">
-                      <a:noFill/>
-                      <a:prstDash val="solid"/>
-                      <a:round/>
-                      <a:headEnd type="none" w="med" len="med"/>
-                      <a:tailEnd type="none" w="med" len="med"/>
-                    </a:lnR>
-                    <a:lnT w="12700" cap="flat" cmpd="sng" algn="ctr">
-                      <a:noFill/>
-                      <a:prstDash val="solid"/>
-                      <a:round/>
-                      <a:headEnd type="none" w="med" len="med"/>
-                      <a:tailEnd type="none" w="med" len="med"/>
-                    </a:lnT>
-                    <a:lnB w="12700" cap="flat" cmpd="sng" algn="ctr">
-                      <a:noFill/>
-                      <a:prstDash val="solid"/>
-                      <a:round/>
-                      <a:headEnd type="none" w="med" len="med"/>
-                      <a:tailEnd type="none" w="med" len="med"/>
-                    </a:lnB>
-                    <a:lnTlToBr w="12700" cmpd="sng">
-                      <a:noFill/>
-                      <a:prstDash val="solid"/>
-                    </a:lnTlToBr>
-                    <a:lnBlToTr w="12700" cmpd="sng">
-                      <a:noFill/>
-                      <a:prstDash val="solid"/>
-                    </a:lnBlToTr>
-                    <a:solidFill>
-                      <a:schemeClr val="bg1"/>
-                    </a:solidFill>
-                  </a:tcPr>
-                </a:tc>
-                <a:extLst>
-                  <a:ext uri="{0D108BD9-81ED-4DB2-BD59-A6C34878D82A}">
-                    <a16:rowId xmlns:a16="http://schemas.microsoft.com/office/drawing/2014/main" val="10002"/>
-                  </a:ext>
-                </a:extLst>
-              </a:tr>
-              <a:tr h="366617">
-                <a:tc>
-                  <a:txBody>
-                    <a:bodyPr/>
-                    <a:lstStyle/>
-                    <a:p>
-                      <a:r>
-                        <a:rPr lang="en-US" sz="800" b="0" i="0" dirty="0">
-                          <a:solidFill>
-                            <a:schemeClr val="tx1"/>
-                          </a:solidFill>
-                          <a:latin typeface="+mn-lt"/>
-                          <a:ea typeface="Calibri Light" charset="0"/>
-                          <a:cs typeface="Calibri Light" charset="0"/>
-                        </a:rPr>
-                        <a:t>Body copy</a:t>
-                      </a:r>
-                    </a:p>
-                  </a:txBody>
-                  <a:tcPr anchor="ctr">
-                    <a:lnL w="12700" cap="flat" cmpd="sng" algn="ctr">
-                      <a:noFill/>
-                      <a:prstDash val="solid"/>
-                      <a:round/>
-                      <a:headEnd type="none" w="med" len="med"/>
-                      <a:tailEnd type="none" w="med" len="med"/>
-                    </a:lnL>
-                    <a:lnR w="12700" cap="flat" cmpd="sng" algn="ctr">
-                      <a:noFill/>
-                      <a:prstDash val="solid"/>
-                      <a:round/>
-                      <a:headEnd type="none" w="med" len="med"/>
-                      <a:tailEnd type="none" w="med" len="med"/>
-                    </a:lnR>
-                    <a:lnT w="12700" cap="flat" cmpd="sng" algn="ctr">
-                      <a:noFill/>
-                      <a:prstDash val="solid"/>
-                      <a:round/>
-                      <a:headEnd type="none" w="med" len="med"/>
-                      <a:tailEnd type="none" w="med" len="med"/>
-                    </a:lnT>
-                    <a:lnB w="6350" cap="flat" cmpd="sng" algn="ctr">
-                      <a:noFill/>
-                      <a:prstDash val="solid"/>
-                      <a:round/>
-                      <a:headEnd type="none" w="med" len="med"/>
-                      <a:tailEnd type="none" w="med" len="med"/>
-                    </a:lnB>
-                    <a:lnTlToBr w="12700" cmpd="sng">
-                      <a:noFill/>
-                      <a:prstDash val="solid"/>
-                    </a:lnTlToBr>
-                    <a:lnBlToTr w="12700" cmpd="sng">
-                      <a:noFill/>
-                      <a:prstDash val="solid"/>
-                    </a:lnBlToTr>
-                    <a:solidFill>
-                      <a:schemeClr val="bg1">
-                        <a:lumMod val="95000"/>
-                      </a:schemeClr>
-                    </a:solidFill>
-                  </a:tcPr>
-                </a:tc>
-                <a:tc>
-                  <a:txBody>
-                    <a:bodyPr/>
-                    <a:lstStyle/>
-                    <a:p>
-                      <a:r>
-                        <a:rPr lang="en-US" sz="800" b="0" i="0" dirty="0">
-                          <a:solidFill>
-                            <a:schemeClr val="tx1"/>
-                          </a:solidFill>
-                          <a:latin typeface="+mn-lt"/>
-                          <a:ea typeface="Calibri Light" charset="0"/>
-                          <a:cs typeface="Calibri Light" charset="0"/>
-                        </a:rPr>
-                        <a:t>Body copy</a:t>
-                      </a:r>
-                    </a:p>
-                  </a:txBody>
-                  <a:tcPr anchor="ctr">
-                    <a:lnL w="12700" cap="flat" cmpd="sng" algn="ctr">
-                      <a:noFill/>
-                      <a:prstDash val="solid"/>
-                      <a:round/>
-                      <a:headEnd type="none" w="med" len="med"/>
-                      <a:tailEnd type="none" w="med" len="med"/>
-                    </a:lnL>
-                    <a:lnR w="12700" cap="flat" cmpd="sng" algn="ctr">
-                      <a:noFill/>
-                      <a:prstDash val="solid"/>
-                      <a:round/>
-                      <a:headEnd type="none" w="med" len="med"/>
-                      <a:tailEnd type="none" w="med" len="med"/>
-                    </a:lnR>
-                    <a:lnT w="12700" cap="flat" cmpd="sng" algn="ctr">
-                      <a:noFill/>
-                      <a:prstDash val="solid"/>
-                      <a:round/>
-                      <a:headEnd type="none" w="med" len="med"/>
-                      <a:tailEnd type="none" w="med" len="med"/>
-                    </a:lnT>
-                    <a:lnB w="6350" cap="flat" cmpd="sng" algn="ctr">
-                      <a:noFill/>
-                      <a:prstDash val="solid"/>
-                      <a:round/>
-                      <a:headEnd type="none" w="med" len="med"/>
-                      <a:tailEnd type="none" w="med" len="med"/>
-                    </a:lnB>
-                    <a:lnTlToBr w="12700" cmpd="sng">
-                      <a:noFill/>
-                      <a:prstDash val="solid"/>
-                    </a:lnTlToBr>
-                    <a:lnBlToTr w="12700" cmpd="sng">
-                      <a:noFill/>
-                      <a:prstDash val="solid"/>
-                    </a:lnBlToTr>
-                    <a:solidFill>
-                      <a:schemeClr val="bg1">
-                        <a:lumMod val="95000"/>
-                      </a:schemeClr>
-                    </a:solidFill>
-                  </a:tcPr>
-                </a:tc>
-                <a:tc>
-                  <a:txBody>
-                    <a:bodyPr/>
-                    <a:lstStyle/>
-                    <a:p>
-                      <a:r>
-                        <a:rPr lang="en-US" sz="800" b="0" i="0" dirty="0">
-                          <a:solidFill>
-                            <a:schemeClr val="tx1"/>
-                          </a:solidFill>
-                          <a:latin typeface="+mn-lt"/>
-                          <a:ea typeface="Calibri Light" charset="0"/>
-                          <a:cs typeface="Calibri Light" charset="0"/>
-                        </a:rPr>
-                        <a:t>Body copy</a:t>
-                      </a:r>
-                    </a:p>
-                  </a:txBody>
-                  <a:tcPr anchor="ctr">
-                    <a:lnL w="12700" cap="flat" cmpd="sng" algn="ctr">
-                      <a:noFill/>
-                      <a:prstDash val="solid"/>
-                      <a:round/>
-                      <a:headEnd type="none" w="med" len="med"/>
-                      <a:tailEnd type="none" w="med" len="med"/>
-                    </a:lnL>
-                    <a:lnR w="12700" cap="flat" cmpd="sng" algn="ctr">
-                      <a:noFill/>
-                      <a:prstDash val="solid"/>
-                      <a:round/>
-                      <a:headEnd type="none" w="med" len="med"/>
-                      <a:tailEnd type="none" w="med" len="med"/>
-                    </a:lnR>
-                    <a:lnT w="12700" cap="flat" cmpd="sng" algn="ctr">
-                      <a:noFill/>
-                      <a:prstDash val="solid"/>
-                      <a:round/>
-                      <a:headEnd type="none" w="med" len="med"/>
-                      <a:tailEnd type="none" w="med" len="med"/>
-                    </a:lnT>
-                    <a:lnB w="6350" cap="flat" cmpd="sng" algn="ctr">
-                      <a:noFill/>
-                      <a:prstDash val="solid"/>
-                      <a:round/>
-                      <a:headEnd type="none" w="med" len="med"/>
-                      <a:tailEnd type="none" w="med" len="med"/>
-                    </a:lnB>
-                    <a:lnTlToBr w="12700" cmpd="sng">
-                      <a:noFill/>
-                      <a:prstDash val="solid"/>
-                    </a:lnTlToBr>
-                    <a:lnBlToTr w="12700" cmpd="sng">
-                      <a:noFill/>
-                      <a:prstDash val="solid"/>
-                    </a:lnBlToTr>
-                    <a:solidFill>
-                      <a:schemeClr val="bg1">
-                        <a:lumMod val="95000"/>
-                      </a:schemeClr>
-                    </a:solidFill>
-                  </a:tcPr>
-                </a:tc>
-                <a:extLst>
-                  <a:ext uri="{0D108BD9-81ED-4DB2-BD59-A6C34878D82A}">
-                    <a16:rowId xmlns:a16="http://schemas.microsoft.com/office/drawing/2014/main" val="10003"/>
-                  </a:ext>
-                </a:extLst>
-              </a:tr>
-              <a:tr h="366617">
-                <a:tc>
-                  <a:txBody>
-                    <a:bodyPr/>
-                    <a:lstStyle/>
-                    <a:p>
-                      <a:r>
-                        <a:rPr lang="en-US" sz="800" b="0" i="0" dirty="0">
-                          <a:solidFill>
-                            <a:schemeClr val="tx1"/>
-                          </a:solidFill>
-                          <a:latin typeface="+mn-lt"/>
-                          <a:ea typeface="Calibri Light" charset="0"/>
-                          <a:cs typeface="Calibri Light" charset="0"/>
-                        </a:rPr>
-                        <a:t>Body copy</a:t>
-                      </a:r>
-                    </a:p>
-                  </a:txBody>
-                  <a:tcPr anchor="ctr">
-                    <a:lnL w="12700" cap="flat" cmpd="sng" algn="ctr">
-                      <a:noFill/>
-                      <a:prstDash val="solid"/>
-                      <a:round/>
-                      <a:headEnd type="none" w="med" len="med"/>
-                      <a:tailEnd type="none" w="med" len="med"/>
-                    </a:lnL>
-                    <a:lnR w="12700" cap="flat" cmpd="sng" algn="ctr">
-                      <a:noFill/>
-                      <a:prstDash val="solid"/>
-                      <a:round/>
-                      <a:headEnd type="none" w="med" len="med"/>
-                      <a:tailEnd type="none" w="med" len="med"/>
-                    </a:lnR>
-                    <a:lnT w="12700" cap="flat" cmpd="sng" algn="ctr">
-                      <a:noFill/>
-                      <a:prstDash val="solid"/>
-                      <a:round/>
-                      <a:headEnd type="none" w="med" len="med"/>
-                      <a:tailEnd type="none" w="med" len="med"/>
-                    </a:lnT>
-                    <a:lnB w="6350" cap="flat" cmpd="sng" algn="ctr">
-                      <a:noFill/>
-                      <a:prstDash val="solid"/>
-                      <a:round/>
-                      <a:headEnd type="none" w="med" len="med"/>
-                      <a:tailEnd type="none" w="med" len="med"/>
-                    </a:lnB>
-                    <a:lnTlToBr w="12700" cmpd="sng">
-                      <a:noFill/>
-                      <a:prstDash val="solid"/>
-                    </a:lnTlToBr>
-                    <a:lnBlToTr w="12700" cmpd="sng">
-                      <a:noFill/>
-                      <a:prstDash val="solid"/>
-                    </a:lnBlToTr>
-                    <a:solidFill>
-                      <a:schemeClr val="bg1"/>
-                    </a:solidFill>
-                  </a:tcPr>
-                </a:tc>
-                <a:tc>
-                  <a:txBody>
-                    <a:bodyPr/>
-                    <a:lstStyle/>
-                    <a:p>
-                      <a:r>
-                        <a:rPr lang="en-US" sz="800" b="0" i="0" dirty="0">
-                          <a:solidFill>
-                            <a:schemeClr val="tx1"/>
-                          </a:solidFill>
-                          <a:latin typeface="+mn-lt"/>
-                          <a:ea typeface="Calibri Light" charset="0"/>
-                          <a:cs typeface="Calibri Light" charset="0"/>
-                        </a:rPr>
-                        <a:t>Body copy</a:t>
-                      </a:r>
-                    </a:p>
-                  </a:txBody>
-                  <a:tcPr anchor="ctr">
-                    <a:lnL w="12700" cap="flat" cmpd="sng" algn="ctr">
-                      <a:noFill/>
-                      <a:prstDash val="solid"/>
-                      <a:round/>
-                      <a:headEnd type="none" w="med" len="med"/>
-                      <a:tailEnd type="none" w="med" len="med"/>
-                    </a:lnL>
-                    <a:lnR w="12700" cap="flat" cmpd="sng" algn="ctr">
-                      <a:noFill/>
-                      <a:prstDash val="solid"/>
-                      <a:round/>
-                      <a:headEnd type="none" w="med" len="med"/>
-                      <a:tailEnd type="none" w="med" len="med"/>
-                    </a:lnR>
-                    <a:lnT w="12700" cap="flat" cmpd="sng" algn="ctr">
-                      <a:noFill/>
-                      <a:prstDash val="solid"/>
-                      <a:round/>
-                      <a:headEnd type="none" w="med" len="med"/>
-                      <a:tailEnd type="none" w="med" len="med"/>
-                    </a:lnT>
-                    <a:lnB w="6350" cap="flat" cmpd="sng" algn="ctr">
-                      <a:noFill/>
-                      <a:prstDash val="solid"/>
-                      <a:round/>
-                      <a:headEnd type="none" w="med" len="med"/>
-                      <a:tailEnd type="none" w="med" len="med"/>
-                    </a:lnB>
-                    <a:lnTlToBr w="12700" cmpd="sng">
-                      <a:noFill/>
-                      <a:prstDash val="solid"/>
-                    </a:lnTlToBr>
-                    <a:lnBlToTr w="12700" cmpd="sng">
-                      <a:noFill/>
-                      <a:prstDash val="solid"/>
-                    </a:lnBlToTr>
-                    <a:solidFill>
-                      <a:schemeClr val="bg1"/>
-                    </a:solidFill>
-                  </a:tcPr>
-                </a:tc>
-                <a:tc>
-                  <a:txBody>
-                    <a:bodyPr/>
-                    <a:lstStyle/>
-                    <a:p>
-                      <a:r>
-                        <a:rPr lang="en-US" sz="800" b="0" i="0" dirty="0">
-                          <a:solidFill>
-                            <a:schemeClr val="tx1"/>
-                          </a:solidFill>
-                          <a:latin typeface="+mn-lt"/>
-                          <a:ea typeface="Calibri Light" charset="0"/>
-                          <a:cs typeface="Calibri Light" charset="0"/>
-                        </a:rPr>
-                        <a:t>Body copy</a:t>
-                      </a:r>
-                    </a:p>
-                  </a:txBody>
-                  <a:tcPr anchor="ctr">
-                    <a:lnL w="12700" cap="flat" cmpd="sng" algn="ctr">
-                      <a:noFill/>
-                      <a:prstDash val="solid"/>
-                      <a:round/>
-                      <a:headEnd type="none" w="med" len="med"/>
-                      <a:tailEnd type="none" w="med" len="med"/>
-                    </a:lnL>
-                    <a:lnR w="12700" cap="flat" cmpd="sng" algn="ctr">
-                      <a:noFill/>
-                      <a:prstDash val="solid"/>
-                      <a:round/>
-                      <a:headEnd type="none" w="med" len="med"/>
-                      <a:tailEnd type="none" w="med" len="med"/>
-                    </a:lnR>
-                    <a:lnT w="12700" cap="flat" cmpd="sng" algn="ctr">
-                      <a:noFill/>
-                      <a:prstDash val="solid"/>
-                      <a:round/>
-                      <a:headEnd type="none" w="med" len="med"/>
-                      <a:tailEnd type="none" w="med" len="med"/>
-                    </a:lnT>
-                    <a:lnB w="6350" cap="flat" cmpd="sng" algn="ctr">
-                      <a:noFill/>
-                      <a:prstDash val="solid"/>
-                      <a:round/>
-                      <a:headEnd type="none" w="med" len="med"/>
-                      <a:tailEnd type="none" w="med" len="med"/>
-                    </a:lnB>
-                    <a:lnTlToBr w="12700" cmpd="sng">
-                      <a:noFill/>
-                      <a:prstDash val="solid"/>
-                    </a:lnTlToBr>
-                    <a:lnBlToTr w="12700" cmpd="sng">
-                      <a:noFill/>
-                      <a:prstDash val="solid"/>
-                    </a:lnBlToTr>
-                    <a:solidFill>
-                      <a:schemeClr val="bg1"/>
-                    </a:solidFill>
-                  </a:tcPr>
-                </a:tc>
-                <a:extLst>
-                  <a:ext uri="{0D108BD9-81ED-4DB2-BD59-A6C34878D82A}">
-                    <a16:rowId xmlns:a16="http://schemas.microsoft.com/office/drawing/2014/main" val="4110504597"/>
-                  </a:ext>
-                </a:extLst>
-              </a:tr>
-              <a:tr h="366617">
-                <a:tc>
-                  <a:txBody>
-                    <a:bodyPr/>
-                    <a:lstStyle/>
-                    <a:p>
-                      <a:r>
-                        <a:rPr lang="en-US" sz="800" b="0" i="0" dirty="0">
-                          <a:solidFill>
-                            <a:schemeClr val="tx1"/>
-                          </a:solidFill>
-                          <a:latin typeface="+mn-lt"/>
-                          <a:ea typeface="Calibri Light" charset="0"/>
-                          <a:cs typeface="Calibri Light" charset="0"/>
-                        </a:rPr>
-                        <a:t>Body copy</a:t>
-                      </a:r>
-                    </a:p>
-                  </a:txBody>
-                  <a:tcPr anchor="ctr">
-                    <a:lnL w="12700" cap="flat" cmpd="sng" algn="ctr">
-                      <a:noFill/>
-                      <a:prstDash val="solid"/>
-                      <a:round/>
-                      <a:headEnd type="none" w="med" len="med"/>
-                      <a:tailEnd type="none" w="med" len="med"/>
-                    </a:lnL>
-                    <a:lnR w="12700" cap="flat" cmpd="sng" algn="ctr">
-                      <a:noFill/>
-                      <a:prstDash val="solid"/>
-                      <a:round/>
-                      <a:headEnd type="none" w="med" len="med"/>
-                      <a:tailEnd type="none" w="med" len="med"/>
-                    </a:lnR>
-                    <a:lnT w="12700" cap="flat" cmpd="sng" algn="ctr">
-                      <a:noFill/>
-                      <a:prstDash val="solid"/>
-                      <a:round/>
-                      <a:headEnd type="none" w="med" len="med"/>
-                      <a:tailEnd type="none" w="med" len="med"/>
-                    </a:lnT>
-                    <a:lnB w="6350" cap="flat" cmpd="sng" algn="ctr">
-                      <a:noFill/>
-                      <a:prstDash val="solid"/>
-                      <a:round/>
-                      <a:headEnd type="none" w="med" len="med"/>
-                      <a:tailEnd type="none" w="med" len="med"/>
-                    </a:lnB>
-                    <a:lnTlToBr w="12700" cmpd="sng">
-                      <a:noFill/>
-                      <a:prstDash val="solid"/>
-                    </a:lnTlToBr>
-                    <a:lnBlToTr w="12700" cmpd="sng">
-                      <a:noFill/>
-                      <a:prstDash val="solid"/>
-                    </a:lnBlToTr>
-                    <a:solidFill>
-                      <a:schemeClr val="bg1">
-                        <a:lumMod val="95000"/>
-                      </a:schemeClr>
-                    </a:solidFill>
-                  </a:tcPr>
-                </a:tc>
-                <a:tc>
-                  <a:txBody>
-                    <a:bodyPr/>
-                    <a:lstStyle/>
-                    <a:p>
-                      <a:r>
-                        <a:rPr lang="en-US" sz="800" b="0" i="0" dirty="0">
-                          <a:solidFill>
-                            <a:schemeClr val="tx1"/>
-                          </a:solidFill>
-                          <a:latin typeface="+mn-lt"/>
-                          <a:ea typeface="Calibri Light" charset="0"/>
-                          <a:cs typeface="Calibri Light" charset="0"/>
-                        </a:rPr>
-                        <a:t>Body copy</a:t>
-                      </a:r>
-                    </a:p>
-                  </a:txBody>
-                  <a:tcPr anchor="ctr">
-                    <a:lnL w="12700" cap="flat" cmpd="sng" algn="ctr">
-                      <a:noFill/>
-                      <a:prstDash val="solid"/>
-                      <a:round/>
-                      <a:headEnd type="none" w="med" len="med"/>
-                      <a:tailEnd type="none" w="med" len="med"/>
-                    </a:lnL>
-                    <a:lnR w="12700" cap="flat" cmpd="sng" algn="ctr">
-                      <a:noFill/>
-                      <a:prstDash val="solid"/>
-                      <a:round/>
-                      <a:headEnd type="none" w="med" len="med"/>
-                      <a:tailEnd type="none" w="med" len="med"/>
-                    </a:lnR>
-                    <a:lnT w="12700" cap="flat" cmpd="sng" algn="ctr">
-                      <a:noFill/>
-                      <a:prstDash val="solid"/>
-                      <a:round/>
-                      <a:headEnd type="none" w="med" len="med"/>
-                      <a:tailEnd type="none" w="med" len="med"/>
-                    </a:lnT>
-                    <a:lnB w="6350" cap="flat" cmpd="sng" algn="ctr">
-                      <a:noFill/>
-                      <a:prstDash val="solid"/>
-                      <a:round/>
-                      <a:headEnd type="none" w="med" len="med"/>
-                      <a:tailEnd type="none" w="med" len="med"/>
-                    </a:lnB>
-                    <a:lnTlToBr w="12700" cmpd="sng">
-                      <a:noFill/>
-                      <a:prstDash val="solid"/>
-                    </a:lnTlToBr>
-                    <a:lnBlToTr w="12700" cmpd="sng">
-                      <a:noFill/>
-                      <a:prstDash val="solid"/>
-                    </a:lnBlToTr>
-                    <a:solidFill>
-                      <a:schemeClr val="bg1">
-                        <a:lumMod val="95000"/>
-                      </a:schemeClr>
-                    </a:solidFill>
-                  </a:tcPr>
-                </a:tc>
-                <a:tc>
-                  <a:txBody>
-                    <a:bodyPr/>
-                    <a:lstStyle/>
-                    <a:p>
-                      <a:r>
-                        <a:rPr lang="en-US" sz="800" b="0" i="0" dirty="0">
-                          <a:solidFill>
-                            <a:schemeClr val="tx1"/>
-                          </a:solidFill>
-                          <a:latin typeface="+mn-lt"/>
-                          <a:ea typeface="Calibri Light" charset="0"/>
-                          <a:cs typeface="Calibri Light" charset="0"/>
-                        </a:rPr>
-                        <a:t>Body copy</a:t>
-                      </a:r>
-                    </a:p>
-                  </a:txBody>
-                  <a:tcPr anchor="ctr">
-                    <a:lnL w="12700" cap="flat" cmpd="sng" algn="ctr">
-                      <a:noFill/>
-                      <a:prstDash val="solid"/>
-                      <a:round/>
-                      <a:headEnd type="none" w="med" len="med"/>
-                      <a:tailEnd type="none" w="med" len="med"/>
-                    </a:lnL>
-                    <a:lnR w="12700" cap="flat" cmpd="sng" algn="ctr">
-                      <a:noFill/>
-                      <a:prstDash val="solid"/>
-                      <a:round/>
-                      <a:headEnd type="none" w="med" len="med"/>
-                      <a:tailEnd type="none" w="med" len="med"/>
-                    </a:lnR>
-                    <a:lnT w="12700" cap="flat" cmpd="sng" algn="ctr">
-                      <a:noFill/>
-                      <a:prstDash val="solid"/>
-                      <a:round/>
-                      <a:headEnd type="none" w="med" len="med"/>
-                      <a:tailEnd type="none" w="med" len="med"/>
-                    </a:lnT>
-                    <a:lnB w="6350" cap="flat" cmpd="sng" algn="ctr">
-                      <a:noFill/>
-                      <a:prstDash val="solid"/>
-                      <a:round/>
-                      <a:headEnd type="none" w="med" len="med"/>
-                      <a:tailEnd type="none" w="med" len="med"/>
-                    </a:lnB>
-                    <a:lnTlToBr w="12700" cmpd="sng">
-                      <a:noFill/>
-                      <a:prstDash val="solid"/>
-                    </a:lnTlToBr>
-                    <a:lnBlToTr w="12700" cmpd="sng">
-                      <a:noFill/>
-                      <a:prstDash val="solid"/>
-                    </a:lnBlToTr>
-                    <a:solidFill>
-                      <a:schemeClr val="bg1">
-                        <a:lumMod val="95000"/>
-                      </a:schemeClr>
-                    </a:solidFill>
-                  </a:tcPr>
-                </a:tc>
-                <a:extLst>
-                  <a:ext uri="{0D108BD9-81ED-4DB2-BD59-A6C34878D82A}">
-                    <a16:rowId xmlns:a16="http://schemas.microsoft.com/office/drawing/2014/main" val="22633469"/>
-                  </a:ext>
-                </a:extLst>
-              </a:tr>
-              <a:tr h="366617">
-                <a:tc>
-                  <a:txBody>
-                    <a:bodyPr/>
-                    <a:lstStyle/>
-                    <a:p>
-                      <a:r>
-                        <a:rPr lang="en-US" sz="800" b="0" i="0" dirty="0">
-                          <a:solidFill>
-                            <a:schemeClr val="tx1"/>
-                          </a:solidFill>
-                          <a:latin typeface="+mn-lt"/>
-                          <a:ea typeface="Calibri Light" charset="0"/>
-                          <a:cs typeface="Calibri Light" charset="0"/>
-                        </a:rPr>
-                        <a:t>Body copy</a:t>
-                      </a:r>
-                    </a:p>
-                  </a:txBody>
-                  <a:tcPr anchor="ctr">
-                    <a:lnL w="12700" cap="flat" cmpd="sng" algn="ctr">
-                      <a:noFill/>
-                      <a:prstDash val="solid"/>
-                      <a:round/>
-                      <a:headEnd type="none" w="med" len="med"/>
-                      <a:tailEnd type="none" w="med" len="med"/>
-                    </a:lnL>
-                    <a:lnR w="12700" cap="flat" cmpd="sng" algn="ctr">
-                      <a:noFill/>
-                      <a:prstDash val="solid"/>
-                      <a:round/>
-                      <a:headEnd type="none" w="med" len="med"/>
-                      <a:tailEnd type="none" w="med" len="med"/>
-                    </a:lnR>
-                    <a:lnT w="12700" cap="flat" cmpd="sng" algn="ctr">
-                      <a:noFill/>
-                      <a:prstDash val="solid"/>
-                      <a:round/>
-                      <a:headEnd type="none" w="med" len="med"/>
-                      <a:tailEnd type="none" w="med" len="med"/>
-                    </a:lnT>
-                    <a:lnB w="6350" cap="flat" cmpd="sng" algn="ctr">
-                      <a:noFill/>
-                      <a:prstDash val="solid"/>
-                      <a:round/>
-                      <a:headEnd type="none" w="med" len="med"/>
-                      <a:tailEnd type="none" w="med" len="med"/>
-                    </a:lnB>
-                    <a:lnTlToBr w="12700" cmpd="sng">
-                      <a:noFill/>
-                      <a:prstDash val="solid"/>
-                    </a:lnTlToBr>
-                    <a:lnBlToTr w="12700" cmpd="sng">
-                      <a:noFill/>
-                      <a:prstDash val="solid"/>
-                    </a:lnBlToTr>
-                    <a:solidFill>
-                      <a:schemeClr val="bg1"/>
-                    </a:solidFill>
-                  </a:tcPr>
-                </a:tc>
-                <a:tc>
-                  <a:txBody>
-                    <a:bodyPr/>
-                    <a:lstStyle/>
-                    <a:p>
-                      <a:r>
-                        <a:rPr lang="en-US" sz="800" b="0" i="0" dirty="0">
-                          <a:solidFill>
-                            <a:schemeClr val="tx1"/>
-                          </a:solidFill>
-                          <a:latin typeface="+mn-lt"/>
-                          <a:ea typeface="Calibri Light" charset="0"/>
-                          <a:cs typeface="Calibri Light" charset="0"/>
-                        </a:rPr>
-                        <a:t>Body copy</a:t>
-                      </a:r>
-                    </a:p>
-                  </a:txBody>
-                  <a:tcPr anchor="ctr">
-                    <a:lnL w="12700" cap="flat" cmpd="sng" algn="ctr">
-                      <a:noFill/>
-                      <a:prstDash val="solid"/>
-                      <a:round/>
-                      <a:headEnd type="none" w="med" len="med"/>
-                      <a:tailEnd type="none" w="med" len="med"/>
-                    </a:lnL>
-                    <a:lnR w="12700" cap="flat" cmpd="sng" algn="ctr">
-                      <a:noFill/>
-                      <a:prstDash val="solid"/>
-                      <a:round/>
-                      <a:headEnd type="none" w="med" len="med"/>
-                      <a:tailEnd type="none" w="med" len="med"/>
-                    </a:lnR>
-                    <a:lnT w="12700" cap="flat" cmpd="sng" algn="ctr">
-                      <a:noFill/>
-                      <a:prstDash val="solid"/>
-                      <a:round/>
-                      <a:headEnd type="none" w="med" len="med"/>
-                      <a:tailEnd type="none" w="med" len="med"/>
-                    </a:lnT>
-                    <a:lnB w="6350" cap="flat" cmpd="sng" algn="ctr">
-                      <a:noFill/>
-                      <a:prstDash val="solid"/>
-                      <a:round/>
-                      <a:headEnd type="none" w="med" len="med"/>
-                      <a:tailEnd type="none" w="med" len="med"/>
-                    </a:lnB>
-                    <a:lnTlToBr w="12700" cmpd="sng">
-                      <a:noFill/>
-                      <a:prstDash val="solid"/>
-                    </a:lnTlToBr>
-                    <a:lnBlToTr w="12700" cmpd="sng">
-                      <a:noFill/>
-                      <a:prstDash val="solid"/>
-                    </a:lnBlToTr>
-                    <a:solidFill>
-                      <a:schemeClr val="bg1"/>
-                    </a:solidFill>
-                  </a:tcPr>
-                </a:tc>
-                <a:tc>
-                  <a:txBody>
-                    <a:bodyPr/>
-                    <a:lstStyle/>
-                    <a:p>
-                      <a:r>
-                        <a:rPr lang="en-US" sz="800" b="0" i="0" dirty="0">
-                          <a:solidFill>
-                            <a:schemeClr val="tx1"/>
-                          </a:solidFill>
-                          <a:latin typeface="+mn-lt"/>
-                          <a:ea typeface="Calibri Light" charset="0"/>
-                          <a:cs typeface="Calibri Light" charset="0"/>
-                        </a:rPr>
-                        <a:t>Body copy</a:t>
-                      </a:r>
-                    </a:p>
-                  </a:txBody>
-                  <a:tcPr anchor="ctr">
-                    <a:lnL w="12700" cap="flat" cmpd="sng" algn="ctr">
-                      <a:noFill/>
-                      <a:prstDash val="solid"/>
-                      <a:round/>
-                      <a:headEnd type="none" w="med" len="med"/>
-                      <a:tailEnd type="none" w="med" len="med"/>
-                    </a:lnL>
-                    <a:lnR w="12700" cap="flat" cmpd="sng" algn="ctr">
-                      <a:noFill/>
-                      <a:prstDash val="solid"/>
-                      <a:round/>
-                      <a:headEnd type="none" w="med" len="med"/>
-                      <a:tailEnd type="none" w="med" len="med"/>
-                    </a:lnR>
-                    <a:lnT w="12700" cap="flat" cmpd="sng" algn="ctr">
-                      <a:noFill/>
-                      <a:prstDash val="solid"/>
-                      <a:round/>
-                      <a:headEnd type="none" w="med" len="med"/>
-                      <a:tailEnd type="none" w="med" len="med"/>
-                    </a:lnT>
-                    <a:lnB w="6350" cap="flat" cmpd="sng" algn="ctr">
-                      <a:noFill/>
-                      <a:prstDash val="solid"/>
-                      <a:round/>
-                      <a:headEnd type="none" w="med" len="med"/>
-                      <a:tailEnd type="none" w="med" len="med"/>
-                    </a:lnB>
-                    <a:lnTlToBr w="12700" cmpd="sng">
-                      <a:noFill/>
-                      <a:prstDash val="solid"/>
-                    </a:lnTlToBr>
-                    <a:lnBlToTr w="12700" cmpd="sng">
-                      <a:noFill/>
-                      <a:prstDash val="solid"/>
-                    </a:lnBlToTr>
-                    <a:solidFill>
-                      <a:schemeClr val="bg1"/>
-                    </a:solidFill>
-                  </a:tcPr>
-                </a:tc>
-                <a:extLst>
-                  <a:ext uri="{0D108BD9-81ED-4DB2-BD59-A6C34878D82A}">
-                    <a16:rowId xmlns:a16="http://schemas.microsoft.com/office/drawing/2014/main" val="1098630424"/>
-                  </a:ext>
-                </a:extLst>
-              </a:tr>
-            </a:tbl>
-          </a:graphicData>
-        </a:graphic>
-      </p:graphicFrame>
-      <p:sp>
-        <p:nvSpPr>
-          <p:cNvPr id="10" name="TextBox 9">
-            <a:extLst>
-              <a:ext uri="{FF2B5EF4-FFF2-40B4-BE49-F238E27FC236}">
-                <a16:creationId xmlns:a16="http://schemas.microsoft.com/office/drawing/2014/main" id="{76B731B1-EA39-B441-BDD2-C37F095C480C}"/>
-              </a:ext>
-            </a:extLst>
-          </p:cNvPr>
-          <p:cNvSpPr txBox="1"/>
-          <p:nvPr/>
-        </p:nvSpPr>
-        <p:spPr>
-          <a:xfrm>
-            <a:off x="504826" y="1742086"/>
-            <a:ext cx="3348548" cy="246221"/>
-          </a:xfrm>
-          <a:prstGeom prst="rect">
-            <a:avLst/>
-          </a:prstGeom>
-          <a:noFill/>
-        </p:spPr>
-        <p:txBody>
-          <a:bodyPr wrap="square" lIns="0" rtlCol="0">
-            <a:spAutoFit/>
-          </a:bodyPr>
-          <a:lstStyle/>
-          <a:p>
-            <a:r>
-              <a:rPr lang="en-US" sz="1000" b="1" dirty="0">
-                <a:solidFill>
-                  <a:srgbClr val="0097D9"/>
-                </a:solidFill>
-              </a:rPr>
-              <a:t>TABLE TITLE HERE</a:t>
-            </a:r>
-          </a:p>
-        </p:txBody>
-      </p:sp>
-      <p:sp>
-        <p:nvSpPr>
-          <p:cNvPr id="11" name="Slide Number Placeholder 5">
-            <a:extLst>
-              <a:ext uri="{FF2B5EF4-FFF2-40B4-BE49-F238E27FC236}">
-                <a16:creationId xmlns:a16="http://schemas.microsoft.com/office/drawing/2014/main" id="{FF28650A-4563-3440-84A5-BFA39AAFF5E1}"/>
-              </a:ext>
-            </a:extLst>
-          </p:cNvPr>
-          <p:cNvSpPr>
-            <a:spLocks noGrp="1"/>
-          </p:cNvSpPr>
-          <p:nvPr>
-            <p:ph type="sldNum" sz="quarter" idx="12"/>
-          </p:nvPr>
-        </p:nvSpPr>
-        <p:spPr>
-          <a:xfrm>
-            <a:off x="8549974" y="4821306"/>
-            <a:ext cx="409324" cy="215444"/>
-          </a:xfrm>
-        </p:spPr>
-        <p:txBody>
-          <a:bodyPr/>
-          <a:lstStyle/>
-          <a:p>
-            <a:fld id="{535EF33A-04D8-4107-96E5-33B70AE88DFF}" type="slidenum">
-              <a:rPr lang="en-US" smtClean="0"/>
-              <a:pPr/>
-              <a:t>15</a:t>
-            </a:fld>
-            <a:endParaRPr lang="en-US" dirty="0"/>
-          </a:p>
-        </p:txBody>
-      </p:sp>
-    </p:spTree>
-    <p:extLst>
-      <p:ext uri="{BB962C8B-B14F-4D97-AF65-F5344CB8AC3E}">
-        <p14:creationId xmlns:p14="http://schemas.microsoft.com/office/powerpoint/2010/main" val="2312894845"/>
-      </p:ext>
-    </p:extLst>
-  </p:cSld>
-  <p:clrMapOvr>
-    <a:masterClrMapping/>
-  </p:clrMapOvr>
-</p:sld>
-</file>
-
 <file path=ppt/slides/slide2.xml><?xml version="1.0" encoding="utf-8"?>
 <p:sld xmlns:a="http://schemas.openxmlformats.org/drawingml/2006/main" xmlns:r="http://schemas.openxmlformats.org/officeDocument/2006/relationships" xmlns:p="http://schemas.openxmlformats.org/presentationml/2006/main">
   <p:cSld>
@@ -19145,13 +15189,13 @@
   <p:clrMapOvr>
     <a:masterClrMapping/>
   </p:clrMapOvr>
-  <mc:AlternateContent xmlns:mc="http://schemas.openxmlformats.org/markup-compatibility/2006">
-    <mc:Choice xmlns:p14="http://schemas.microsoft.com/office/powerpoint/2010/main" Requires="p14">
+  <mc:AlternateContent xmlns:mc="http://schemas.openxmlformats.org/markup-compatibility/2006" xmlns:p14="http://schemas.microsoft.com/office/powerpoint/2010/main">
+    <mc:Choice Requires="p14">
       <p:transition spd="med" p14:dur="700">
         <p:fade/>
       </p:transition>
     </mc:Choice>
-    <mc:Fallback>
+    <mc:Fallback xmlns="">
       <p:transition spd="med">
         <p:fade/>
       </p:transition>
@@ -19362,22 +15406,22 @@
           <a:p>
             <a:r>
               <a:rPr lang="en-US" dirty="0"/>
-              <a:t>-Played for Louisville kings</a:t>
-            </a:r>
-          </a:p>
-          <a:p>
+              <a:t>-Played for Louisville </a:t>
+            </a:r>
+            <a:r>
+              <a:rPr lang="en-US" dirty="0" err="1"/>
+              <a:t>Mings</a:t>
+            </a:r>
             <a:endParaRPr lang="en-US" dirty="0"/>
           </a:p>
           <a:p>
+            <a:endParaRPr lang="en-US" dirty="0"/>
+          </a:p>
+          <a:p>
             <a:r>
               <a:rPr lang="en-US" dirty="0"/>
-              <a:t>-Won two Division IV national </a:t>
-            </a:r>
-            <a:r>
-              <a:rPr lang="en-US" dirty="0" err="1"/>
-              <a:t>champtionships</a:t>
-            </a:r>
-            <a:endParaRPr lang="en-US" dirty="0"/>
+              <a:t>-Won two Division IV national championships</a:t>
+            </a:r>
           </a:p>
         </p:txBody>
       </p:sp>
@@ -19466,13 +15510,13 @@
   <p:clrMapOvr>
     <a:masterClrMapping/>
   </p:clrMapOvr>
-  <mc:AlternateContent xmlns:mc="http://schemas.openxmlformats.org/markup-compatibility/2006">
-    <mc:Choice xmlns:p14="http://schemas.microsoft.com/office/powerpoint/2010/main" Requires="p14">
+  <mc:AlternateContent xmlns:mc="http://schemas.openxmlformats.org/markup-compatibility/2006" xmlns:p14="http://schemas.microsoft.com/office/powerpoint/2010/main">
+    <mc:Choice Requires="p14">
       <p:transition spd="med" p14:dur="700">
         <p:fade/>
       </p:transition>
     </mc:Choice>
-    <mc:Fallback>
+    <mc:Fallback xmlns="">
       <p:transition spd="med">
         <p:fade/>
       </p:transition>
@@ -20332,6 +16376,17 @@
 </file>
 
 <file path=customXml/item1.xml><?xml version="1.0" encoding="utf-8"?>
+<p:properties xmlns:p="http://schemas.microsoft.com/office/2006/metadata/properties" xmlns:xsi="http://www.w3.org/2001/XMLSchema-instance" xmlns:pc="http://schemas.microsoft.com/office/infopath/2007/PartnerControls">
+  <documentManagement>
+    <lcf76f155ced4ddcb4097134ff3c332f xmlns="d2a9f884-c2eb-4182-8d97-b2c1069a1e77">
+      <Terms xmlns="http://schemas.microsoft.com/office/infopath/2007/PartnerControls"/>
+    </lcf76f155ced4ddcb4097134ff3c332f>
+    <TaxCatchAll xmlns="872877ae-a410-445f-835b-653367d2e530" xsi:nil="true"/>
+  </documentManagement>
+</p:properties>
+</file>
+
+<file path=customXml/item2.xml><?xml version="1.0" encoding="utf-8"?>
 <ct:contentTypeSchema xmlns:ct="http://schemas.microsoft.com/office/2006/metadata/contentType" xmlns:ma="http://schemas.microsoft.com/office/2006/metadata/properties/metaAttributes" ct:_="" ma:_="" ma:contentTypeName="Document" ma:contentTypeID="0x010100FEF7458C51E57141848015B90E19E3FF" ma:contentTypeVersion="15" ma:contentTypeDescription="Create a new document." ma:contentTypeScope="" ma:versionID="12fb0db276e8be4984a0823ffe929ad1">
   <xsd:schema xmlns:xsd="http://www.w3.org/2001/XMLSchema" xmlns:xs="http://www.w3.org/2001/XMLSchema" xmlns:p="http://schemas.microsoft.com/office/2006/metadata/properties" xmlns:ns2="d2a9f884-c2eb-4182-8d97-b2c1069a1e77" xmlns:ns3="ad1dcd44-2c79-421e-996d-e07b6b6a06b7" xmlns:ns4="872877ae-a410-445f-835b-653367d2e530" targetNamespace="http://schemas.microsoft.com/office/2006/metadata/properties" ma:root="true" ma:fieldsID="7f400bb4bb80b6365717ab8834d3c4dc" ns2:_="" ns3:_="" ns4:_="">
     <xsd:import namespace="d2a9f884-c2eb-4182-8d97-b2c1069a1e77"/>
@@ -20567,17 +16622,6 @@
 </ct:contentTypeSchema>
 </file>
 
-<file path=customXml/item2.xml><?xml version="1.0" encoding="utf-8"?>
-<p:properties xmlns:p="http://schemas.microsoft.com/office/2006/metadata/properties" xmlns:xsi="http://www.w3.org/2001/XMLSchema-instance" xmlns:pc="http://schemas.microsoft.com/office/infopath/2007/PartnerControls">
-  <documentManagement>
-    <lcf76f155ced4ddcb4097134ff3c332f xmlns="d2a9f884-c2eb-4182-8d97-b2c1069a1e77">
-      <Terms xmlns="http://schemas.microsoft.com/office/infopath/2007/PartnerControls"/>
-    </lcf76f155ced4ddcb4097134ff3c332f>
-    <TaxCatchAll xmlns="872877ae-a410-445f-835b-653367d2e530" xsi:nil="true"/>
-  </documentManagement>
-</p:properties>
-</file>
-
 <file path=customXml/item3.xml><?xml version="1.0" encoding="utf-8"?>
 <?mso-contentType ?>
 <FormTemplates xmlns="http://schemas.microsoft.com/sharepoint/v3/contenttype/forms">
@@ -20588,6 +16632,24 @@
 </file>
 
 <file path=customXml/itemProps1.xml><?xml version="1.0" encoding="utf-8"?>
+<ds:datastoreItem xmlns:ds="http://schemas.openxmlformats.org/officeDocument/2006/customXml" ds:itemID="{E3F0252B-B6E9-4221-B01E-0247E154DC26}">
+  <ds:schemaRefs>
+    <ds:schemaRef ds:uri="http://purl.org/dc/elements/1.1/"/>
+    <ds:schemaRef ds:uri="http://schemas.openxmlformats.org/package/2006/metadata/core-properties"/>
+    <ds:schemaRef ds:uri="ad1dcd44-2c79-421e-996d-e07b6b6a06b7"/>
+    <ds:schemaRef ds:uri="872877ae-a410-445f-835b-653367d2e530"/>
+    <ds:schemaRef ds:uri="http://schemas.microsoft.com/office/infopath/2007/PartnerControls"/>
+    <ds:schemaRef ds:uri="http://purl.org/dc/terms/"/>
+    <ds:schemaRef ds:uri="http://schemas.microsoft.com/office/2006/metadata/properties"/>
+    <ds:schemaRef ds:uri="http://schemas.microsoft.com/office/2006/documentManagement/types"/>
+    <ds:schemaRef ds:uri="d2a9f884-c2eb-4182-8d97-b2c1069a1e77"/>
+    <ds:schemaRef ds:uri="http://www.w3.org/XML/1998/namespace"/>
+    <ds:schemaRef ds:uri="http://purl.org/dc/dcmitype/"/>
+  </ds:schemaRefs>
+</ds:datastoreItem>
+</file>
+
+<file path=customXml/itemProps2.xml><?xml version="1.0" encoding="utf-8"?>
 <ds:datastoreItem xmlns:ds="http://schemas.openxmlformats.org/officeDocument/2006/customXml" ds:itemID="{466406F6-04EA-49D7-891D-0329DF4DFC24}">
   <ds:schemaRefs>
     <ds:schemaRef ds:uri="http://schemas.microsoft.com/office/2006/metadata/contentType"/>
@@ -20607,24 +16669,6 @@
 </ds:datastoreItem>
 </file>
 
-<file path=customXml/itemProps2.xml><?xml version="1.0" encoding="utf-8"?>
-<ds:datastoreItem xmlns:ds="http://schemas.openxmlformats.org/officeDocument/2006/customXml" ds:itemID="{E3F0252B-B6E9-4221-B01E-0247E154DC26}">
-  <ds:schemaRefs>
-    <ds:schemaRef ds:uri="http://purl.org/dc/elements/1.1/"/>
-    <ds:schemaRef ds:uri="http://schemas.openxmlformats.org/package/2006/metadata/core-properties"/>
-    <ds:schemaRef ds:uri="ad1dcd44-2c79-421e-996d-e07b6b6a06b7"/>
-    <ds:schemaRef ds:uri="872877ae-a410-445f-835b-653367d2e530"/>
-    <ds:schemaRef ds:uri="http://schemas.microsoft.com/office/infopath/2007/PartnerControls"/>
-    <ds:schemaRef ds:uri="http://purl.org/dc/terms/"/>
-    <ds:schemaRef ds:uri="http://schemas.microsoft.com/office/2006/metadata/properties"/>
-    <ds:schemaRef ds:uri="http://schemas.microsoft.com/office/2006/documentManagement/types"/>
-    <ds:schemaRef ds:uri="d2a9f884-c2eb-4182-8d97-b2c1069a1e77"/>
-    <ds:schemaRef ds:uri="http://www.w3.org/XML/1998/namespace"/>
-    <ds:schemaRef ds:uri="http://purl.org/dc/dcmitype/"/>
-  </ds:schemaRefs>
-</ds:datastoreItem>
-</file>
-
 <file path=customXml/itemProps3.xml><?xml version="1.0" encoding="utf-8"?>
 <ds:datastoreItem xmlns:ds="http://schemas.openxmlformats.org/officeDocument/2006/customXml" ds:itemID="{F11117D9-2152-408D-8EA9-A138D8484626}">
   <ds:schemaRefs>

</xml_diff>